<commit_message>
modified graph drawing function
</commit_message>
<xml_diff>
--- a/Project2/project2b/Graph/structure.pptx
+++ b/Project2/project2b/Graph/structure.pptx
@@ -6,6 +6,7 @@
   </p:sldMasterIdLst>
   <p:sldIdLst>
     <p:sldId id="256" r:id="rId2"/>
+    <p:sldId id="257" r:id="rId3"/>
   </p:sldIdLst>
   <p:sldSz cx="12192000" cy="6858000"/>
   <p:notesSz cx="6858000" cy="9144000"/>
@@ -104,6 +105,11 @@
       </a:defRPr>
     </a:lvl9pPr>
   </p:defaultTextStyle>
+  <p:extLst>
+    <p:ext uri="{EFAFB233-063F-42B5-8137-9DF3F51BA10A}">
+      <p15:sldGuideLst xmlns:p15="http://schemas.microsoft.com/office/powerpoint/2012/main"/>
+    </p:ext>
+  </p:extLst>
 </p:presentation>
 </file>
 
@@ -238,7 +244,7 @@
           <a:p>
             <a:fld id="{4C9C7290-AFEF-4445-B241-928C826760F9}" type="datetimeFigureOut">
               <a:rPr lang="en-US" smtClean="0"/>
-              <a:t>11/6/17</a:t>
+              <a:t>11/12/17</a:t>
             </a:fld>
             <a:endParaRPr lang="en-US"/>
           </a:p>
@@ -408,7 +414,7 @@
           <a:p>
             <a:fld id="{4C9C7290-AFEF-4445-B241-928C826760F9}" type="datetimeFigureOut">
               <a:rPr lang="en-US" smtClean="0"/>
-              <a:t>11/6/17</a:t>
+              <a:t>11/12/17</a:t>
             </a:fld>
             <a:endParaRPr lang="en-US"/>
           </a:p>
@@ -588,7 +594,7 @@
           <a:p>
             <a:fld id="{4C9C7290-AFEF-4445-B241-928C826760F9}" type="datetimeFigureOut">
               <a:rPr lang="en-US" smtClean="0"/>
-              <a:t>11/6/17</a:t>
+              <a:t>11/12/17</a:t>
             </a:fld>
             <a:endParaRPr lang="en-US"/>
           </a:p>
@@ -758,7 +764,7 @@
           <a:p>
             <a:fld id="{4C9C7290-AFEF-4445-B241-928C826760F9}" type="datetimeFigureOut">
               <a:rPr lang="en-US" smtClean="0"/>
-              <a:t>11/6/17</a:t>
+              <a:t>11/12/17</a:t>
             </a:fld>
             <a:endParaRPr lang="en-US"/>
           </a:p>
@@ -1004,7 +1010,7 @@
           <a:p>
             <a:fld id="{4C9C7290-AFEF-4445-B241-928C826760F9}" type="datetimeFigureOut">
               <a:rPr lang="en-US" smtClean="0"/>
-              <a:t>11/6/17</a:t>
+              <a:t>11/12/17</a:t>
             </a:fld>
             <a:endParaRPr lang="en-US"/>
           </a:p>
@@ -1236,7 +1242,7 @@
           <a:p>
             <a:fld id="{4C9C7290-AFEF-4445-B241-928C826760F9}" type="datetimeFigureOut">
               <a:rPr lang="en-US" smtClean="0"/>
-              <a:t>11/6/17</a:t>
+              <a:t>11/12/17</a:t>
             </a:fld>
             <a:endParaRPr lang="en-US"/>
           </a:p>
@@ -1603,7 +1609,7 @@
           <a:p>
             <a:fld id="{4C9C7290-AFEF-4445-B241-928C826760F9}" type="datetimeFigureOut">
               <a:rPr lang="en-US" smtClean="0"/>
-              <a:t>11/6/17</a:t>
+              <a:t>11/12/17</a:t>
             </a:fld>
             <a:endParaRPr lang="en-US"/>
           </a:p>
@@ -1721,7 +1727,7 @@
           <a:p>
             <a:fld id="{4C9C7290-AFEF-4445-B241-928C826760F9}" type="datetimeFigureOut">
               <a:rPr lang="en-US" smtClean="0"/>
-              <a:t>11/6/17</a:t>
+              <a:t>11/12/17</a:t>
             </a:fld>
             <a:endParaRPr lang="en-US"/>
           </a:p>
@@ -1816,7 +1822,7 @@
           <a:p>
             <a:fld id="{4C9C7290-AFEF-4445-B241-928C826760F9}" type="datetimeFigureOut">
               <a:rPr lang="en-US" smtClean="0"/>
-              <a:t>11/6/17</a:t>
+              <a:t>11/12/17</a:t>
             </a:fld>
             <a:endParaRPr lang="en-US"/>
           </a:p>
@@ -2093,7 +2099,7 @@
           <a:p>
             <a:fld id="{4C9C7290-AFEF-4445-B241-928C826760F9}" type="datetimeFigureOut">
               <a:rPr lang="en-US" smtClean="0"/>
-              <a:t>11/6/17</a:t>
+              <a:t>11/12/17</a:t>
             </a:fld>
             <a:endParaRPr lang="en-US"/>
           </a:p>
@@ -2346,7 +2352,7 @@
           <a:p>
             <a:fld id="{4C9C7290-AFEF-4445-B241-928C826760F9}" type="datetimeFigureOut">
               <a:rPr lang="en-US" smtClean="0"/>
-              <a:t>11/6/17</a:t>
+              <a:t>11/12/17</a:t>
             </a:fld>
             <a:endParaRPr lang="en-US"/>
           </a:p>
@@ -2559,7 +2565,7 @@
           <a:p>
             <a:fld id="{4C9C7290-AFEF-4445-B241-928C826760F9}" type="datetimeFigureOut">
               <a:rPr lang="en-US" smtClean="0"/>
-              <a:t>11/6/17</a:t>
+              <a:t>11/12/17</a:t>
             </a:fld>
             <a:endParaRPr lang="en-US"/>
           </a:p>
@@ -2964,106 +2970,125 @@
           <a:chExt cx="0" cy="0"/>
         </a:xfrm>
       </p:grpSpPr>
-      <p:sp>
-        <p:nvSpPr>
-          <p:cNvPr id="4" name="Rectangle 3"/>
-          <p:cNvSpPr/>
+      <p:grpSp>
+        <p:nvGrpSpPr>
+          <p:cNvPr id="2" name="Group 1"/>
+          <p:cNvGrpSpPr/>
           <p:nvPr/>
-        </p:nvSpPr>
-        <p:spPr>
-          <a:xfrm>
-            <a:off x="1285201" y="2242875"/>
-            <a:ext cx="900000" cy="288000"/>
-          </a:xfrm>
-          <a:prstGeom prst="rect">
-            <a:avLst/>
-          </a:prstGeom>
-          <a:solidFill>
-            <a:schemeClr val="accent1">
-              <a:lumMod val="60000"/>
-              <a:lumOff val="40000"/>
-            </a:schemeClr>
-          </a:solidFill>
-        </p:spPr>
-        <p:style>
-          <a:lnRef idx="2">
-            <a:schemeClr val="accent1">
-              <a:shade val="50000"/>
-            </a:schemeClr>
-          </a:lnRef>
-          <a:fillRef idx="1">
-            <a:schemeClr val="accent1"/>
-          </a:fillRef>
-          <a:effectRef idx="0">
-            <a:schemeClr val="accent1"/>
-          </a:effectRef>
-          <a:fontRef idx="minor">
-            <a:schemeClr val="lt1"/>
-          </a:fontRef>
-        </p:style>
-        <p:txBody>
-          <a:bodyPr rtlCol="0" anchor="ctr"/>
-          <a:lstStyle/>
-          <a:p>
-            <a:pPr algn="ctr"/>
-            <a:r>
-              <a:rPr lang="en-US" dirty="0" smtClean="0"/>
-              <a:t>x</a:t>
-            </a:r>
-            <a:endParaRPr lang="en-US" dirty="0"/>
-          </a:p>
-        </p:txBody>
-      </p:sp>
-      <p:sp>
-        <p:nvSpPr>
-          <p:cNvPr id="5" name="Rectangle 4"/>
-          <p:cNvSpPr/>
-          <p:nvPr/>
-        </p:nvSpPr>
-        <p:spPr>
-          <a:xfrm>
-            <a:off x="1285200" y="2641964"/>
-            <a:ext cx="900000" cy="288000"/>
-          </a:xfrm>
-          <a:prstGeom prst="rect">
-            <a:avLst/>
-          </a:prstGeom>
-          <a:solidFill>
-            <a:schemeClr val="accent1">
-              <a:lumMod val="60000"/>
-              <a:lumOff val="40000"/>
-            </a:schemeClr>
-          </a:solidFill>
-        </p:spPr>
-        <p:style>
-          <a:lnRef idx="2">
-            <a:schemeClr val="accent1">
-              <a:shade val="50000"/>
-            </a:schemeClr>
-          </a:lnRef>
-          <a:fillRef idx="1">
-            <a:schemeClr val="accent1"/>
-          </a:fillRef>
-          <a:effectRef idx="0">
-            <a:schemeClr val="accent1"/>
-          </a:effectRef>
-          <a:fontRef idx="minor">
-            <a:schemeClr val="lt1"/>
-          </a:fontRef>
-        </p:style>
-        <p:txBody>
-          <a:bodyPr rtlCol="0" anchor="ctr"/>
-          <a:lstStyle/>
-          <a:p>
-            <a:pPr algn="ctr"/>
-            <a:r>
-              <a:rPr lang="en-US" dirty="0" err="1" smtClean="0"/>
-              <a:t>Tilde_x</a:t>
-            </a:r>
-            <a:endParaRPr lang="en-US" dirty="0"/>
-          </a:p>
-        </p:txBody>
-      </p:sp>
+        </p:nvGrpSpPr>
+        <p:grpSpPr>
+          <a:xfrm>
+            <a:off x="324000" y="2344281"/>
+            <a:ext cx="2822400" cy="572983"/>
+            <a:chOff x="324000" y="2344281"/>
+            <a:chExt cx="2822400" cy="572983"/>
+          </a:xfrm>
+        </p:grpSpPr>
+        <p:sp>
+          <p:nvSpPr>
+            <p:cNvPr id="4" name="Rectangle 3"/>
+            <p:cNvSpPr/>
+            <p:nvPr/>
+          </p:nvSpPr>
+          <p:spPr>
+            <a:xfrm>
+              <a:off x="324000" y="2344281"/>
+              <a:ext cx="2822400" cy="288000"/>
+            </a:xfrm>
+            <a:prstGeom prst="rect">
+              <a:avLst/>
+            </a:prstGeom>
+            <a:solidFill>
+              <a:schemeClr val="accent1">
+                <a:lumMod val="60000"/>
+                <a:lumOff val="40000"/>
+              </a:schemeClr>
+            </a:solidFill>
+          </p:spPr>
+          <p:style>
+            <a:lnRef idx="2">
+              <a:schemeClr val="accent1">
+                <a:shade val="50000"/>
+              </a:schemeClr>
+            </a:lnRef>
+            <a:fillRef idx="1">
+              <a:schemeClr val="accent1"/>
+            </a:fillRef>
+            <a:effectRef idx="0">
+              <a:schemeClr val="accent1"/>
+            </a:effectRef>
+            <a:fontRef idx="minor">
+              <a:schemeClr val="lt1"/>
+            </a:fontRef>
+          </p:style>
+          <p:txBody>
+            <a:bodyPr rtlCol="0" anchor="ctr"/>
+            <a:lstStyle/>
+            <a:p>
+              <a:pPr algn="ctr"/>
+              <a:r>
+                <a:rPr lang="en-US" dirty="0" smtClean="0"/>
+                <a:t>X (784)</a:t>
+              </a:r>
+              <a:endParaRPr lang="en-US" dirty="0"/>
+            </a:p>
+          </p:txBody>
+        </p:sp>
+        <p:sp>
+          <p:nvSpPr>
+            <p:cNvPr id="5" name="Rectangle 4"/>
+            <p:cNvSpPr/>
+            <p:nvPr/>
+          </p:nvSpPr>
+          <p:spPr>
+            <a:xfrm>
+              <a:off x="324000" y="2629264"/>
+              <a:ext cx="2822400" cy="288000"/>
+            </a:xfrm>
+            <a:prstGeom prst="rect">
+              <a:avLst/>
+            </a:prstGeom>
+            <a:solidFill>
+              <a:schemeClr val="accent1">
+                <a:lumMod val="60000"/>
+                <a:lumOff val="40000"/>
+              </a:schemeClr>
+            </a:solidFill>
+          </p:spPr>
+          <p:style>
+            <a:lnRef idx="2">
+              <a:schemeClr val="accent1">
+                <a:shade val="50000"/>
+              </a:schemeClr>
+            </a:lnRef>
+            <a:fillRef idx="1">
+              <a:schemeClr val="accent1"/>
+            </a:fillRef>
+            <a:effectRef idx="0">
+              <a:schemeClr val="accent1"/>
+            </a:effectRef>
+            <a:fontRef idx="minor">
+              <a:schemeClr val="lt1"/>
+            </a:fontRef>
+          </p:style>
+          <p:txBody>
+            <a:bodyPr rtlCol="0" anchor="ctr"/>
+            <a:lstStyle/>
+            <a:p>
+              <a:pPr algn="ctr"/>
+              <a:r>
+                <a:rPr lang="en-US" dirty="0" err="1" smtClean="0"/>
+                <a:t>Tilde_x</a:t>
+              </a:r>
+              <a:r>
+                <a:rPr lang="en-US" dirty="0" smtClean="0"/>
+                <a:t> (784)</a:t>
+              </a:r>
+              <a:endParaRPr lang="en-US" dirty="0"/>
+            </a:p>
+          </p:txBody>
+        </p:sp>
+      </p:grpSp>
       <p:sp>
         <p:nvSpPr>
           <p:cNvPr id="6" name="Rectangle 5"/>
@@ -3108,7 +3133,7 @@
             <a:pPr algn="ctr"/>
             <a:r>
               <a:rPr lang="en-US" dirty="0" smtClean="0"/>
-              <a:t>y1</a:t>
+              <a:t>Y1 (900)</a:t>
             </a:r>
             <a:endParaRPr lang="en-US" dirty="0"/>
           </a:p>
@@ -3122,8 +3147,8 @@
         </p:nvSpPr>
         <p:spPr>
           <a:xfrm>
-            <a:off x="1285200" y="3440141"/>
-            <a:ext cx="900000" cy="288000"/>
+            <a:off x="324000" y="3434482"/>
+            <a:ext cx="2822400" cy="288000"/>
           </a:xfrm>
           <a:prstGeom prst="rect">
             <a:avLst/>
@@ -3158,22 +3183,691 @@
             <a:pPr algn="ctr"/>
             <a:r>
               <a:rPr lang="en-US" dirty="0" smtClean="0"/>
-              <a:t>z1</a:t>
+              <a:t>Z1 (784)</a:t>
             </a:r>
             <a:endParaRPr lang="en-US" dirty="0"/>
           </a:p>
         </p:txBody>
       </p:sp>
-      <p:sp>
-        <p:nvSpPr>
-          <p:cNvPr id="8" name="Rectangle 7"/>
+      <p:grpSp>
+        <p:nvGrpSpPr>
+          <p:cNvPr id="3" name="Group 2"/>
+          <p:cNvGrpSpPr/>
+          <p:nvPr/>
+        </p:nvGrpSpPr>
+        <p:grpSpPr>
+          <a:xfrm>
+            <a:off x="3385234" y="2357175"/>
+            <a:ext cx="3240000" cy="572789"/>
+            <a:chOff x="3385234" y="2357175"/>
+            <a:chExt cx="3240000" cy="572789"/>
+          </a:xfrm>
+        </p:grpSpPr>
+        <p:sp>
+          <p:nvSpPr>
+            <p:cNvPr id="8" name="Rectangle 7"/>
+            <p:cNvSpPr/>
+            <p:nvPr/>
+          </p:nvSpPr>
+          <p:spPr>
+            <a:xfrm>
+              <a:off x="3385234" y="2357175"/>
+              <a:ext cx="3240000" cy="288000"/>
+            </a:xfrm>
+            <a:prstGeom prst="rect">
+              <a:avLst/>
+            </a:prstGeom>
+            <a:solidFill>
+              <a:schemeClr val="accent2">
+                <a:lumMod val="60000"/>
+                <a:lumOff val="40000"/>
+              </a:schemeClr>
+            </a:solidFill>
+          </p:spPr>
+          <p:style>
+            <a:lnRef idx="2">
+              <a:schemeClr val="accent1">
+                <a:shade val="50000"/>
+              </a:schemeClr>
+            </a:lnRef>
+            <a:fillRef idx="1">
+              <a:schemeClr val="accent1"/>
+            </a:fillRef>
+            <a:effectRef idx="0">
+              <a:schemeClr val="accent1"/>
+            </a:effectRef>
+            <a:fontRef idx="minor">
+              <a:schemeClr val="lt1"/>
+            </a:fontRef>
+          </p:style>
+          <p:txBody>
+            <a:bodyPr rtlCol="0" anchor="ctr"/>
+            <a:lstStyle/>
+            <a:p>
+              <a:pPr algn="ctr"/>
+              <a:r>
+                <a:rPr lang="en-US" dirty="0" smtClean="0"/>
+                <a:t>Y1 (900)</a:t>
+              </a:r>
+              <a:endParaRPr lang="en-US" dirty="0"/>
+            </a:p>
+          </p:txBody>
+        </p:sp>
+        <p:sp>
+          <p:nvSpPr>
+            <p:cNvPr id="9" name="Rectangle 8"/>
+            <p:cNvSpPr/>
+            <p:nvPr/>
+          </p:nvSpPr>
+          <p:spPr>
+            <a:xfrm>
+              <a:off x="3385234" y="2641964"/>
+              <a:ext cx="3240000" cy="288000"/>
+            </a:xfrm>
+            <a:prstGeom prst="rect">
+              <a:avLst/>
+            </a:prstGeom>
+            <a:solidFill>
+              <a:schemeClr val="accent2">
+                <a:lumMod val="60000"/>
+                <a:lumOff val="40000"/>
+              </a:schemeClr>
+            </a:solidFill>
+          </p:spPr>
+          <p:style>
+            <a:lnRef idx="2">
+              <a:schemeClr val="accent1">
+                <a:shade val="50000"/>
+              </a:schemeClr>
+            </a:lnRef>
+            <a:fillRef idx="1">
+              <a:schemeClr val="accent1"/>
+            </a:fillRef>
+            <a:effectRef idx="0">
+              <a:schemeClr val="accent1"/>
+            </a:effectRef>
+            <a:fontRef idx="minor">
+              <a:schemeClr val="lt1"/>
+            </a:fontRef>
+          </p:style>
+          <p:txBody>
+            <a:bodyPr rtlCol="0" anchor="ctr"/>
+            <a:lstStyle/>
+            <a:p>
+              <a:pPr algn="ctr"/>
+              <a:r>
+                <a:rPr lang="en-US" dirty="0" smtClean="0"/>
+                <a:t>Tilde_y1 (900)</a:t>
+              </a:r>
+            </a:p>
+          </p:txBody>
+        </p:sp>
+      </p:grpSp>
+      <p:sp>
+        <p:nvSpPr>
+          <p:cNvPr id="10" name="Rectangle 9"/>
           <p:cNvSpPr/>
           <p:nvPr/>
         </p:nvSpPr>
         <p:spPr>
           <a:xfrm>
-            <a:off x="3385234" y="2242875"/>
+            <a:off x="3880234" y="3041053"/>
+            <a:ext cx="2250000" cy="288000"/>
+          </a:xfrm>
+          <a:prstGeom prst="rect">
+            <a:avLst/>
+          </a:prstGeom>
+          <a:solidFill>
+            <a:schemeClr val="accent6">
+              <a:lumMod val="40000"/>
+              <a:lumOff val="60000"/>
+            </a:schemeClr>
+          </a:solidFill>
+        </p:spPr>
+        <p:style>
+          <a:lnRef idx="2">
+            <a:schemeClr val="accent1">
+              <a:shade val="50000"/>
+            </a:schemeClr>
+          </a:lnRef>
+          <a:fillRef idx="1">
+            <a:schemeClr val="accent1"/>
+          </a:fillRef>
+          <a:effectRef idx="0">
+            <a:schemeClr val="accent1"/>
+          </a:effectRef>
+          <a:fontRef idx="minor">
+            <a:schemeClr val="lt1"/>
+          </a:fontRef>
+        </p:style>
+        <p:txBody>
+          <a:bodyPr rtlCol="0" anchor="ctr"/>
+          <a:lstStyle/>
+          <a:p>
+            <a:pPr algn="ctr"/>
+            <a:r>
+              <a:rPr lang="en-US" dirty="0" smtClean="0"/>
+              <a:t>Y2 (625)</a:t>
+            </a:r>
+            <a:endParaRPr lang="en-US" dirty="0"/>
+          </a:p>
+        </p:txBody>
+      </p:sp>
+      <p:sp>
+        <p:nvSpPr>
+          <p:cNvPr id="11" name="Rectangle 10"/>
+          <p:cNvSpPr/>
+          <p:nvPr/>
+        </p:nvSpPr>
+        <p:spPr>
+          <a:xfrm>
+            <a:off x="3385234" y="3440141"/>
             <a:ext cx="3240000" cy="288000"/>
+          </a:xfrm>
+          <a:prstGeom prst="rect">
+            <a:avLst/>
+          </a:prstGeom>
+          <a:solidFill>
+            <a:schemeClr val="accent6">
+              <a:lumMod val="40000"/>
+              <a:lumOff val="60000"/>
+            </a:schemeClr>
+          </a:solidFill>
+        </p:spPr>
+        <p:style>
+          <a:lnRef idx="2">
+            <a:schemeClr val="accent1">
+              <a:shade val="50000"/>
+            </a:schemeClr>
+          </a:lnRef>
+          <a:fillRef idx="1">
+            <a:schemeClr val="accent1"/>
+          </a:fillRef>
+          <a:effectRef idx="0">
+            <a:schemeClr val="accent1"/>
+          </a:effectRef>
+          <a:fontRef idx="minor">
+            <a:schemeClr val="lt1"/>
+          </a:fontRef>
+        </p:style>
+        <p:txBody>
+          <a:bodyPr rtlCol="0" anchor="ctr"/>
+          <a:lstStyle/>
+          <a:p>
+            <a:pPr algn="ctr"/>
+            <a:r>
+              <a:rPr lang="en-US" dirty="0" smtClean="0"/>
+              <a:t>Z2 (900)</a:t>
+            </a:r>
+            <a:endParaRPr lang="en-US" dirty="0"/>
+          </a:p>
+        </p:txBody>
+      </p:sp>
+      <p:grpSp>
+        <p:nvGrpSpPr>
+          <p:cNvPr id="20" name="Group 19"/>
+          <p:cNvGrpSpPr/>
+          <p:nvPr/>
+        </p:nvGrpSpPr>
+        <p:grpSpPr>
+          <a:xfrm>
+            <a:off x="6809672" y="2357175"/>
+            <a:ext cx="2251682" cy="572789"/>
+            <a:chOff x="6809672" y="2357175"/>
+            <a:chExt cx="2251682" cy="572789"/>
+          </a:xfrm>
+        </p:grpSpPr>
+        <p:sp>
+          <p:nvSpPr>
+            <p:cNvPr id="12" name="Rectangle 11"/>
+            <p:cNvSpPr/>
+            <p:nvPr/>
+          </p:nvSpPr>
+          <p:spPr>
+            <a:xfrm>
+              <a:off x="6811354" y="2357175"/>
+              <a:ext cx="2250000" cy="288000"/>
+            </a:xfrm>
+            <a:prstGeom prst="rect">
+              <a:avLst/>
+            </a:prstGeom>
+            <a:solidFill>
+              <a:schemeClr val="accent6">
+                <a:lumMod val="40000"/>
+                <a:lumOff val="60000"/>
+              </a:schemeClr>
+            </a:solidFill>
+          </p:spPr>
+          <p:style>
+            <a:lnRef idx="2">
+              <a:schemeClr val="accent1">
+                <a:shade val="50000"/>
+              </a:schemeClr>
+            </a:lnRef>
+            <a:fillRef idx="1">
+              <a:schemeClr val="accent1"/>
+            </a:fillRef>
+            <a:effectRef idx="0">
+              <a:schemeClr val="accent1"/>
+            </a:effectRef>
+            <a:fontRef idx="minor">
+              <a:schemeClr val="lt1"/>
+            </a:fontRef>
+          </p:style>
+          <p:txBody>
+            <a:bodyPr rtlCol="0" anchor="ctr"/>
+            <a:lstStyle/>
+            <a:p>
+              <a:pPr algn="ctr"/>
+              <a:r>
+                <a:rPr lang="en-US" dirty="0" smtClean="0"/>
+                <a:t>Y2 (625)</a:t>
+              </a:r>
+              <a:endParaRPr lang="en-US" dirty="0"/>
+            </a:p>
+          </p:txBody>
+        </p:sp>
+        <p:sp>
+          <p:nvSpPr>
+            <p:cNvPr id="14" name="Rectangle 13"/>
+            <p:cNvSpPr/>
+            <p:nvPr/>
+          </p:nvSpPr>
+          <p:spPr>
+            <a:xfrm>
+              <a:off x="6809672" y="2641964"/>
+              <a:ext cx="2250000" cy="288000"/>
+            </a:xfrm>
+            <a:prstGeom prst="rect">
+              <a:avLst/>
+            </a:prstGeom>
+            <a:solidFill>
+              <a:schemeClr val="accent6">
+                <a:lumMod val="40000"/>
+                <a:lumOff val="60000"/>
+              </a:schemeClr>
+            </a:solidFill>
+          </p:spPr>
+          <p:style>
+            <a:lnRef idx="2">
+              <a:schemeClr val="accent1">
+                <a:shade val="50000"/>
+              </a:schemeClr>
+            </a:lnRef>
+            <a:fillRef idx="1">
+              <a:schemeClr val="accent1"/>
+            </a:fillRef>
+            <a:effectRef idx="0">
+              <a:schemeClr val="accent1"/>
+            </a:effectRef>
+            <a:fontRef idx="minor">
+              <a:schemeClr val="lt1"/>
+            </a:fontRef>
+          </p:style>
+          <p:txBody>
+            <a:bodyPr rtlCol="0" anchor="ctr"/>
+            <a:lstStyle/>
+            <a:p>
+              <a:pPr algn="ctr"/>
+              <a:r>
+                <a:rPr lang="en-US" dirty="0" smtClean="0"/>
+                <a:t>Tilde_y2 (625)</a:t>
+              </a:r>
+              <a:endParaRPr lang="en-US" dirty="0"/>
+            </a:p>
+          </p:txBody>
+        </p:sp>
+      </p:grpSp>
+      <p:sp>
+        <p:nvSpPr>
+          <p:cNvPr id="15" name="Rectangle 14"/>
+          <p:cNvSpPr/>
+          <p:nvPr/>
+        </p:nvSpPr>
+        <p:spPr>
+          <a:xfrm>
+            <a:off x="7228960" y="3041053"/>
+            <a:ext cx="1440000" cy="288000"/>
+          </a:xfrm>
+          <a:prstGeom prst="rect">
+            <a:avLst/>
+          </a:prstGeom>
+          <a:solidFill>
+            <a:schemeClr val="accent4">
+              <a:lumMod val="60000"/>
+              <a:lumOff val="40000"/>
+            </a:schemeClr>
+          </a:solidFill>
+        </p:spPr>
+        <p:style>
+          <a:lnRef idx="2">
+            <a:schemeClr val="accent1">
+              <a:shade val="50000"/>
+            </a:schemeClr>
+          </a:lnRef>
+          <a:fillRef idx="1">
+            <a:schemeClr val="accent1"/>
+          </a:fillRef>
+          <a:effectRef idx="0">
+            <a:schemeClr val="accent1"/>
+          </a:effectRef>
+          <a:fontRef idx="minor">
+            <a:schemeClr val="lt1"/>
+          </a:fontRef>
+        </p:style>
+        <p:txBody>
+          <a:bodyPr rtlCol="0" anchor="ctr"/>
+          <a:lstStyle/>
+          <a:p>
+            <a:pPr algn="ctr"/>
+            <a:r>
+              <a:rPr lang="en-US" dirty="0" smtClean="0"/>
+              <a:t>Y3 (400)</a:t>
+            </a:r>
+            <a:endParaRPr lang="en-US" dirty="0"/>
+          </a:p>
+        </p:txBody>
+      </p:sp>
+      <p:sp>
+        <p:nvSpPr>
+          <p:cNvPr id="16" name="Rectangle 15"/>
+          <p:cNvSpPr/>
+          <p:nvPr/>
+        </p:nvSpPr>
+        <p:spPr>
+          <a:xfrm>
+            <a:off x="6823960" y="3440141"/>
+            <a:ext cx="2250000" cy="288000"/>
+          </a:xfrm>
+          <a:prstGeom prst="rect">
+            <a:avLst/>
+          </a:prstGeom>
+          <a:solidFill>
+            <a:schemeClr val="accent4">
+              <a:lumMod val="60000"/>
+              <a:lumOff val="40000"/>
+            </a:schemeClr>
+          </a:solidFill>
+        </p:spPr>
+        <p:style>
+          <a:lnRef idx="2">
+            <a:schemeClr val="accent1">
+              <a:shade val="50000"/>
+            </a:schemeClr>
+          </a:lnRef>
+          <a:fillRef idx="1">
+            <a:schemeClr val="accent1"/>
+          </a:fillRef>
+          <a:effectRef idx="0">
+            <a:schemeClr val="accent1"/>
+          </a:effectRef>
+          <a:fontRef idx="minor">
+            <a:schemeClr val="lt1"/>
+          </a:fontRef>
+        </p:style>
+        <p:txBody>
+          <a:bodyPr rtlCol="0" anchor="ctr"/>
+          <a:lstStyle/>
+          <a:p>
+            <a:pPr algn="ctr"/>
+            <a:r>
+              <a:rPr lang="en-US" dirty="0" smtClean="0"/>
+              <a:t>Z3 (625)</a:t>
+            </a:r>
+            <a:endParaRPr lang="en-US" dirty="0"/>
+          </a:p>
+        </p:txBody>
+      </p:sp>
+      <p:sp>
+        <p:nvSpPr>
+          <p:cNvPr id="17" name="TextBox 16"/>
+          <p:cNvSpPr txBox="1"/>
+          <p:nvPr/>
+        </p:nvSpPr>
+        <p:spPr>
+          <a:xfrm>
+            <a:off x="1228729" y="3771898"/>
+            <a:ext cx="2286000" cy="369332"/>
+          </a:xfrm>
+          <a:prstGeom prst="rect">
+            <a:avLst/>
+          </a:prstGeom>
+          <a:noFill/>
+        </p:spPr>
+        <p:txBody>
+          <a:bodyPr wrap="square" rtlCol="0">
+            <a:spAutoFit/>
+          </a:bodyPr>
+          <a:lstStyle/>
+          <a:p>
+            <a:r>
+              <a:rPr lang="en-US" altLang="zh-CN" smtClean="0"/>
+              <a:t>Train y1</a:t>
+            </a:r>
+            <a:endParaRPr lang="en-US"/>
+          </a:p>
+        </p:txBody>
+      </p:sp>
+      <p:sp>
+        <p:nvSpPr>
+          <p:cNvPr id="18" name="TextBox 17"/>
+          <p:cNvSpPr txBox="1"/>
+          <p:nvPr/>
+        </p:nvSpPr>
+        <p:spPr>
+          <a:xfrm>
+            <a:off x="4552899" y="3742428"/>
+            <a:ext cx="2286000" cy="369332"/>
+          </a:xfrm>
+          <a:prstGeom prst="rect">
+            <a:avLst/>
+          </a:prstGeom>
+          <a:noFill/>
+        </p:spPr>
+        <p:txBody>
+          <a:bodyPr wrap="square" rtlCol="0">
+            <a:spAutoFit/>
+          </a:bodyPr>
+          <a:lstStyle/>
+          <a:p>
+            <a:r>
+              <a:rPr lang="en-US" altLang="zh-CN" smtClean="0"/>
+              <a:t>Train y2</a:t>
+            </a:r>
+            <a:endParaRPr lang="en-US"/>
+          </a:p>
+        </p:txBody>
+      </p:sp>
+      <p:sp>
+        <p:nvSpPr>
+          <p:cNvPr id="19" name="TextBox 18"/>
+          <p:cNvSpPr txBox="1"/>
+          <p:nvPr/>
+        </p:nvSpPr>
+        <p:spPr>
+          <a:xfrm>
+            <a:off x="7473786" y="3728141"/>
+            <a:ext cx="1070139" cy="369332"/>
+          </a:xfrm>
+          <a:prstGeom prst="rect">
+            <a:avLst/>
+          </a:prstGeom>
+          <a:noFill/>
+        </p:spPr>
+        <p:txBody>
+          <a:bodyPr wrap="square" rtlCol="0">
+            <a:spAutoFit/>
+          </a:bodyPr>
+          <a:lstStyle/>
+          <a:p>
+            <a:r>
+              <a:rPr lang="en-US" altLang="zh-CN" dirty="0" smtClean="0"/>
+              <a:t>Train y3</a:t>
+            </a:r>
+            <a:endParaRPr lang="en-US" dirty="0"/>
+          </a:p>
+        </p:txBody>
+      </p:sp>
+      <p:sp>
+        <p:nvSpPr>
+          <p:cNvPr id="29" name="Rectangle 28"/>
+          <p:cNvSpPr/>
+          <p:nvPr/>
+        </p:nvSpPr>
+        <p:spPr>
+          <a:xfrm>
+            <a:off x="10187811" y="3240083"/>
+            <a:ext cx="1440000" cy="288000"/>
+          </a:xfrm>
+          <a:prstGeom prst="rect">
+            <a:avLst/>
+          </a:prstGeom>
+          <a:solidFill>
+            <a:schemeClr val="accent4">
+              <a:lumMod val="60000"/>
+              <a:lumOff val="40000"/>
+            </a:schemeClr>
+          </a:solidFill>
+        </p:spPr>
+        <p:style>
+          <a:lnRef idx="2">
+            <a:schemeClr val="accent1">
+              <a:shade val="50000"/>
+            </a:schemeClr>
+          </a:lnRef>
+          <a:fillRef idx="1">
+            <a:schemeClr val="accent1"/>
+          </a:fillRef>
+          <a:effectRef idx="0">
+            <a:schemeClr val="accent1"/>
+          </a:effectRef>
+          <a:fontRef idx="minor">
+            <a:schemeClr val="lt1"/>
+          </a:fontRef>
+        </p:style>
+        <p:txBody>
+          <a:bodyPr rtlCol="0" anchor="ctr"/>
+          <a:lstStyle/>
+          <a:p>
+            <a:pPr algn="ctr"/>
+            <a:r>
+              <a:rPr lang="en-US" dirty="0" smtClean="0"/>
+              <a:t>Y3 (400)</a:t>
+            </a:r>
+            <a:endParaRPr lang="en-US" dirty="0"/>
+          </a:p>
+        </p:txBody>
+      </p:sp>
+      <p:sp>
+        <p:nvSpPr>
+          <p:cNvPr id="30" name="Rectangle 29"/>
+          <p:cNvSpPr/>
+          <p:nvPr/>
+        </p:nvSpPr>
+        <p:spPr>
+          <a:xfrm>
+            <a:off x="9782811" y="3720389"/>
+            <a:ext cx="2250000" cy="288000"/>
+          </a:xfrm>
+          <a:prstGeom prst="rect">
+            <a:avLst/>
+          </a:prstGeom>
+          <a:solidFill>
+            <a:schemeClr val="accent4">
+              <a:lumMod val="60000"/>
+              <a:lumOff val="40000"/>
+            </a:schemeClr>
+          </a:solidFill>
+        </p:spPr>
+        <p:style>
+          <a:lnRef idx="2">
+            <a:schemeClr val="accent1">
+              <a:shade val="50000"/>
+            </a:schemeClr>
+          </a:lnRef>
+          <a:fillRef idx="1">
+            <a:schemeClr val="accent1"/>
+          </a:fillRef>
+          <a:effectRef idx="0">
+            <a:schemeClr val="accent1"/>
+          </a:effectRef>
+          <a:fontRef idx="minor">
+            <a:schemeClr val="lt1"/>
+          </a:fontRef>
+        </p:style>
+        <p:txBody>
+          <a:bodyPr rtlCol="0" anchor="ctr"/>
+          <a:lstStyle/>
+          <a:p>
+            <a:pPr algn="ctr"/>
+            <a:r>
+              <a:rPr lang="en-US" dirty="0" smtClean="0"/>
+              <a:t>Z3 (625)</a:t>
+            </a:r>
+            <a:endParaRPr lang="en-US" dirty="0"/>
+          </a:p>
+        </p:txBody>
+      </p:sp>
+      <p:sp>
+        <p:nvSpPr>
+          <p:cNvPr id="31" name="Rectangle 30"/>
+          <p:cNvSpPr/>
+          <p:nvPr/>
+        </p:nvSpPr>
+        <p:spPr>
+          <a:xfrm>
+            <a:off x="9287811" y="4200695"/>
+            <a:ext cx="3240000" cy="288000"/>
+          </a:xfrm>
+          <a:prstGeom prst="rect">
+            <a:avLst/>
+          </a:prstGeom>
+          <a:solidFill>
+            <a:schemeClr val="accent6">
+              <a:lumMod val="40000"/>
+              <a:lumOff val="60000"/>
+            </a:schemeClr>
+          </a:solidFill>
+        </p:spPr>
+        <p:style>
+          <a:lnRef idx="2">
+            <a:schemeClr val="accent1">
+              <a:shade val="50000"/>
+            </a:schemeClr>
+          </a:lnRef>
+          <a:fillRef idx="1">
+            <a:schemeClr val="accent1"/>
+          </a:fillRef>
+          <a:effectRef idx="0">
+            <a:schemeClr val="accent1"/>
+          </a:effectRef>
+          <a:fontRef idx="minor">
+            <a:schemeClr val="lt1"/>
+          </a:fontRef>
+        </p:style>
+        <p:txBody>
+          <a:bodyPr rtlCol="0" anchor="ctr"/>
+          <a:lstStyle/>
+          <a:p>
+            <a:pPr algn="ctr"/>
+            <a:r>
+              <a:rPr lang="en-US" dirty="0" smtClean="0"/>
+              <a:t>Z2 (900)</a:t>
+            </a:r>
+            <a:endParaRPr lang="en-US" dirty="0"/>
+          </a:p>
+        </p:txBody>
+      </p:sp>
+      <p:sp>
+        <p:nvSpPr>
+          <p:cNvPr id="32" name="Rectangle 31"/>
+          <p:cNvSpPr/>
+          <p:nvPr/>
+        </p:nvSpPr>
+        <p:spPr>
+          <a:xfrm>
+            <a:off x="9496611" y="4681003"/>
+            <a:ext cx="2822400" cy="288000"/>
           </a:xfrm>
           <a:prstGeom prst="rect">
             <a:avLst/>
@@ -3208,7 +3902,7 @@
             <a:pPr algn="ctr"/>
             <a:r>
               <a:rPr lang="en-US" dirty="0" smtClean="0"/>
-              <a:t>y1</a:t>
+              <a:t>Z1 (784)</a:t>
             </a:r>
             <a:endParaRPr lang="en-US" dirty="0"/>
           </a:p>
@@ -3216,14 +3910,668 @@
       </p:sp>
       <p:sp>
         <p:nvSpPr>
-          <p:cNvPr id="9" name="Rectangle 8"/>
+          <p:cNvPr id="33" name="TextBox 32"/>
+          <p:cNvSpPr txBox="1"/>
+          <p:nvPr/>
+        </p:nvSpPr>
+        <p:spPr>
+          <a:xfrm>
+            <a:off x="9482046" y="4978685"/>
+            <a:ext cx="3008452" cy="369332"/>
+          </a:xfrm>
+          <a:prstGeom prst="rect">
+            <a:avLst/>
+          </a:prstGeom>
+          <a:noFill/>
+        </p:spPr>
+        <p:txBody>
+          <a:bodyPr wrap="none" rtlCol="0">
+            <a:spAutoFit/>
+          </a:bodyPr>
+          <a:lstStyle/>
+          <a:p>
+            <a:r>
+              <a:rPr lang="en-US" dirty="0" smtClean="0"/>
+              <a:t>Deep </a:t>
+            </a:r>
+            <a:r>
+              <a:rPr lang="en-US" dirty="0" err="1" smtClean="0"/>
+              <a:t>Denoising</a:t>
+            </a:r>
+            <a:r>
+              <a:rPr lang="en-US" dirty="0" smtClean="0"/>
+              <a:t> Auto-encoder</a:t>
+            </a:r>
+            <a:endParaRPr lang="en-US" dirty="0"/>
+          </a:p>
+        </p:txBody>
+      </p:sp>
+      <p:grpSp>
+        <p:nvGrpSpPr>
+          <p:cNvPr id="35" name="Group 34"/>
+          <p:cNvGrpSpPr/>
+          <p:nvPr/>
+        </p:nvGrpSpPr>
+        <p:grpSpPr>
+          <a:xfrm>
+            <a:off x="9496611" y="944604"/>
+            <a:ext cx="2822400" cy="572983"/>
+            <a:chOff x="324000" y="2344281"/>
+            <a:chExt cx="2822400" cy="572983"/>
+          </a:xfrm>
+        </p:grpSpPr>
+        <p:sp>
+          <p:nvSpPr>
+            <p:cNvPr id="36" name="Rectangle 35"/>
+            <p:cNvSpPr/>
+            <p:nvPr/>
+          </p:nvSpPr>
+          <p:spPr>
+            <a:xfrm>
+              <a:off x="324000" y="2344281"/>
+              <a:ext cx="2822400" cy="288000"/>
+            </a:xfrm>
+            <a:prstGeom prst="rect">
+              <a:avLst/>
+            </a:prstGeom>
+            <a:solidFill>
+              <a:schemeClr val="accent1">
+                <a:lumMod val="60000"/>
+                <a:lumOff val="40000"/>
+              </a:schemeClr>
+            </a:solidFill>
+          </p:spPr>
+          <p:style>
+            <a:lnRef idx="2">
+              <a:schemeClr val="accent1">
+                <a:shade val="50000"/>
+              </a:schemeClr>
+            </a:lnRef>
+            <a:fillRef idx="1">
+              <a:schemeClr val="accent1"/>
+            </a:fillRef>
+            <a:effectRef idx="0">
+              <a:schemeClr val="accent1"/>
+            </a:effectRef>
+            <a:fontRef idx="minor">
+              <a:schemeClr val="lt1"/>
+            </a:fontRef>
+          </p:style>
+          <p:txBody>
+            <a:bodyPr rtlCol="0" anchor="ctr"/>
+            <a:lstStyle/>
+            <a:p>
+              <a:pPr algn="ctr"/>
+              <a:r>
+                <a:rPr lang="en-US" dirty="0" smtClean="0"/>
+                <a:t>X (784)</a:t>
+              </a:r>
+              <a:endParaRPr lang="en-US" dirty="0"/>
+            </a:p>
+          </p:txBody>
+        </p:sp>
+        <p:sp>
+          <p:nvSpPr>
+            <p:cNvPr id="37" name="Rectangle 36"/>
+            <p:cNvSpPr/>
+            <p:nvPr/>
+          </p:nvSpPr>
+          <p:spPr>
+            <a:xfrm>
+              <a:off x="324000" y="2629264"/>
+              <a:ext cx="2822400" cy="288000"/>
+            </a:xfrm>
+            <a:prstGeom prst="rect">
+              <a:avLst/>
+            </a:prstGeom>
+            <a:solidFill>
+              <a:schemeClr val="accent1">
+                <a:lumMod val="60000"/>
+                <a:lumOff val="40000"/>
+              </a:schemeClr>
+            </a:solidFill>
+          </p:spPr>
+          <p:style>
+            <a:lnRef idx="2">
+              <a:schemeClr val="accent1">
+                <a:shade val="50000"/>
+              </a:schemeClr>
+            </a:lnRef>
+            <a:fillRef idx="1">
+              <a:schemeClr val="accent1"/>
+            </a:fillRef>
+            <a:effectRef idx="0">
+              <a:schemeClr val="accent1"/>
+            </a:effectRef>
+            <a:fontRef idx="minor">
+              <a:schemeClr val="lt1"/>
+            </a:fontRef>
+          </p:style>
+          <p:txBody>
+            <a:bodyPr rtlCol="0" anchor="ctr"/>
+            <a:lstStyle/>
+            <a:p>
+              <a:pPr algn="ctr"/>
+              <a:r>
+                <a:rPr lang="en-US" dirty="0" err="1" smtClean="0"/>
+                <a:t>Tilde_x</a:t>
+              </a:r>
+              <a:r>
+                <a:rPr lang="en-US" dirty="0" smtClean="0"/>
+                <a:t> (784)</a:t>
+              </a:r>
+              <a:endParaRPr lang="en-US" dirty="0"/>
+            </a:p>
+          </p:txBody>
+        </p:sp>
+      </p:grpSp>
+      <p:grpSp>
+        <p:nvGrpSpPr>
+          <p:cNvPr id="38" name="Group 37"/>
+          <p:cNvGrpSpPr/>
+          <p:nvPr/>
+        </p:nvGrpSpPr>
+        <p:grpSpPr>
+          <a:xfrm>
+            <a:off x="9287811" y="1709893"/>
+            <a:ext cx="3240000" cy="572789"/>
+            <a:chOff x="3385234" y="2357175"/>
+            <a:chExt cx="3240000" cy="572789"/>
+          </a:xfrm>
+        </p:grpSpPr>
+        <p:sp>
+          <p:nvSpPr>
+            <p:cNvPr id="39" name="Rectangle 38"/>
+            <p:cNvSpPr/>
+            <p:nvPr/>
+          </p:nvSpPr>
+          <p:spPr>
+            <a:xfrm>
+              <a:off x="3385234" y="2357175"/>
+              <a:ext cx="3240000" cy="288000"/>
+            </a:xfrm>
+            <a:prstGeom prst="rect">
+              <a:avLst/>
+            </a:prstGeom>
+            <a:solidFill>
+              <a:schemeClr val="accent2">
+                <a:lumMod val="60000"/>
+                <a:lumOff val="40000"/>
+              </a:schemeClr>
+            </a:solidFill>
+          </p:spPr>
+          <p:style>
+            <a:lnRef idx="2">
+              <a:schemeClr val="accent1">
+                <a:shade val="50000"/>
+              </a:schemeClr>
+            </a:lnRef>
+            <a:fillRef idx="1">
+              <a:schemeClr val="accent1"/>
+            </a:fillRef>
+            <a:effectRef idx="0">
+              <a:schemeClr val="accent1"/>
+            </a:effectRef>
+            <a:fontRef idx="minor">
+              <a:schemeClr val="lt1"/>
+            </a:fontRef>
+          </p:style>
+          <p:txBody>
+            <a:bodyPr rtlCol="0" anchor="ctr"/>
+            <a:lstStyle/>
+            <a:p>
+              <a:pPr algn="ctr"/>
+              <a:r>
+                <a:rPr lang="en-US" dirty="0" smtClean="0"/>
+                <a:t>Y1 (900)</a:t>
+              </a:r>
+              <a:endParaRPr lang="en-US" dirty="0"/>
+            </a:p>
+          </p:txBody>
+        </p:sp>
+        <p:sp>
+          <p:nvSpPr>
+            <p:cNvPr id="40" name="Rectangle 39"/>
+            <p:cNvSpPr/>
+            <p:nvPr/>
+          </p:nvSpPr>
+          <p:spPr>
+            <a:xfrm>
+              <a:off x="3385234" y="2641964"/>
+              <a:ext cx="3240000" cy="288000"/>
+            </a:xfrm>
+            <a:prstGeom prst="rect">
+              <a:avLst/>
+            </a:prstGeom>
+            <a:solidFill>
+              <a:schemeClr val="accent2">
+                <a:lumMod val="60000"/>
+                <a:lumOff val="40000"/>
+              </a:schemeClr>
+            </a:solidFill>
+          </p:spPr>
+          <p:style>
+            <a:lnRef idx="2">
+              <a:schemeClr val="accent1">
+                <a:shade val="50000"/>
+              </a:schemeClr>
+            </a:lnRef>
+            <a:fillRef idx="1">
+              <a:schemeClr val="accent1"/>
+            </a:fillRef>
+            <a:effectRef idx="0">
+              <a:schemeClr val="accent1"/>
+            </a:effectRef>
+            <a:fontRef idx="minor">
+              <a:schemeClr val="lt1"/>
+            </a:fontRef>
+          </p:style>
+          <p:txBody>
+            <a:bodyPr rtlCol="0" anchor="ctr"/>
+            <a:lstStyle/>
+            <a:p>
+              <a:pPr algn="ctr"/>
+              <a:r>
+                <a:rPr lang="en-US" dirty="0" smtClean="0"/>
+                <a:t>Tilde_y1 (900)</a:t>
+              </a:r>
+            </a:p>
+          </p:txBody>
+        </p:sp>
+      </p:grpSp>
+      <p:grpSp>
+        <p:nvGrpSpPr>
+          <p:cNvPr id="41" name="Group 40"/>
+          <p:cNvGrpSpPr/>
+          <p:nvPr/>
+        </p:nvGrpSpPr>
+        <p:grpSpPr>
+          <a:xfrm>
+            <a:off x="9781970" y="2474988"/>
+            <a:ext cx="2251682" cy="572789"/>
+            <a:chOff x="6809672" y="2357175"/>
+            <a:chExt cx="2251682" cy="572789"/>
+          </a:xfrm>
+        </p:grpSpPr>
+        <p:sp>
+          <p:nvSpPr>
+            <p:cNvPr id="42" name="Rectangle 41"/>
+            <p:cNvSpPr/>
+            <p:nvPr/>
+          </p:nvSpPr>
+          <p:spPr>
+            <a:xfrm>
+              <a:off x="6811354" y="2357175"/>
+              <a:ext cx="2250000" cy="288000"/>
+            </a:xfrm>
+            <a:prstGeom prst="rect">
+              <a:avLst/>
+            </a:prstGeom>
+            <a:solidFill>
+              <a:schemeClr val="accent6">
+                <a:lumMod val="40000"/>
+                <a:lumOff val="60000"/>
+              </a:schemeClr>
+            </a:solidFill>
+          </p:spPr>
+          <p:style>
+            <a:lnRef idx="2">
+              <a:schemeClr val="accent1">
+                <a:shade val="50000"/>
+              </a:schemeClr>
+            </a:lnRef>
+            <a:fillRef idx="1">
+              <a:schemeClr val="accent1"/>
+            </a:fillRef>
+            <a:effectRef idx="0">
+              <a:schemeClr val="accent1"/>
+            </a:effectRef>
+            <a:fontRef idx="minor">
+              <a:schemeClr val="lt1"/>
+            </a:fontRef>
+          </p:style>
+          <p:txBody>
+            <a:bodyPr rtlCol="0" anchor="ctr"/>
+            <a:lstStyle/>
+            <a:p>
+              <a:pPr algn="ctr"/>
+              <a:r>
+                <a:rPr lang="en-US" dirty="0" smtClean="0"/>
+                <a:t>Y2 (625)</a:t>
+              </a:r>
+              <a:endParaRPr lang="en-US" dirty="0"/>
+            </a:p>
+          </p:txBody>
+        </p:sp>
+        <p:sp>
+          <p:nvSpPr>
+            <p:cNvPr id="43" name="Rectangle 42"/>
+            <p:cNvSpPr/>
+            <p:nvPr/>
+          </p:nvSpPr>
+          <p:spPr>
+            <a:xfrm>
+              <a:off x="6809672" y="2641964"/>
+              <a:ext cx="2250000" cy="288000"/>
+            </a:xfrm>
+            <a:prstGeom prst="rect">
+              <a:avLst/>
+            </a:prstGeom>
+            <a:solidFill>
+              <a:schemeClr val="accent6">
+                <a:lumMod val="40000"/>
+                <a:lumOff val="60000"/>
+              </a:schemeClr>
+            </a:solidFill>
+          </p:spPr>
+          <p:style>
+            <a:lnRef idx="2">
+              <a:schemeClr val="accent1">
+                <a:shade val="50000"/>
+              </a:schemeClr>
+            </a:lnRef>
+            <a:fillRef idx="1">
+              <a:schemeClr val="accent1"/>
+            </a:fillRef>
+            <a:effectRef idx="0">
+              <a:schemeClr val="accent1"/>
+            </a:effectRef>
+            <a:fontRef idx="minor">
+              <a:schemeClr val="lt1"/>
+            </a:fontRef>
+          </p:style>
+          <p:txBody>
+            <a:bodyPr rtlCol="0" anchor="ctr"/>
+            <a:lstStyle/>
+            <a:p>
+              <a:pPr algn="ctr"/>
+              <a:r>
+                <a:rPr lang="en-US" dirty="0" smtClean="0"/>
+                <a:t>Tilde_y2 (625)</a:t>
+              </a:r>
+              <a:endParaRPr lang="en-US" dirty="0"/>
+            </a:p>
+          </p:txBody>
+        </p:sp>
+      </p:grpSp>
+    </p:spTree>
+    <p:extLst>
+      <p:ext uri="{BB962C8B-B14F-4D97-AF65-F5344CB8AC3E}">
+        <p14:creationId xmlns:p14="http://schemas.microsoft.com/office/powerpoint/2010/main" val="357238648"/>
+      </p:ext>
+    </p:extLst>
+  </p:cSld>
+  <p:clrMapOvr>
+    <a:masterClrMapping/>
+  </p:clrMapOvr>
+</p:sld>
+</file>
+
+<file path=ppt/slides/slide2.xml><?xml version="1.0" encoding="utf-8"?>
+<p:sld xmlns:a="http://schemas.openxmlformats.org/drawingml/2006/main" xmlns:r="http://schemas.openxmlformats.org/officeDocument/2006/relationships" xmlns:p="http://schemas.openxmlformats.org/presentationml/2006/main">
+  <p:cSld>
+    <p:spTree>
+      <p:nvGrpSpPr>
+        <p:cNvPr id="1" name=""/>
+        <p:cNvGrpSpPr/>
+        <p:nvPr/>
+      </p:nvGrpSpPr>
+      <p:grpSpPr>
+        <a:xfrm>
+          <a:off x="0" y="0"/>
+          <a:ext cx="0" cy="0"/>
+          <a:chOff x="0" y="0"/>
+          <a:chExt cx="0" cy="0"/>
+        </a:xfrm>
+      </p:grpSpPr>
+      <p:sp>
+        <p:nvSpPr>
+          <p:cNvPr id="26" name="TextBox 25"/>
+          <p:cNvSpPr txBox="1"/>
+          <p:nvPr/>
+        </p:nvSpPr>
+        <p:spPr>
+          <a:xfrm>
+            <a:off x="6332446" y="5118385"/>
+            <a:ext cx="3795526" cy="369332"/>
+          </a:xfrm>
+          <a:prstGeom prst="rect">
+            <a:avLst/>
+          </a:prstGeom>
+          <a:noFill/>
+        </p:spPr>
+        <p:txBody>
+          <a:bodyPr wrap="none" rtlCol="0">
+            <a:spAutoFit/>
+          </a:bodyPr>
+          <a:lstStyle/>
+          <a:p>
+            <a:r>
+              <a:rPr lang="en-US" dirty="0" smtClean="0"/>
+              <a:t>5 Layer Feed-forward Neuron Network</a:t>
+            </a:r>
+            <a:endParaRPr lang="en-US" dirty="0"/>
+          </a:p>
+        </p:txBody>
+      </p:sp>
+      <p:sp>
+        <p:nvSpPr>
+          <p:cNvPr id="27" name="Rectangle 26"/>
           <p:cNvSpPr/>
           <p:nvPr/>
         </p:nvSpPr>
         <p:spPr>
           <a:xfrm>
-            <a:off x="3385234" y="2641964"/>
+            <a:off x="7599402" y="4226205"/>
+            <a:ext cx="1204936" cy="784746"/>
+          </a:xfrm>
+          <a:prstGeom prst="rect">
+            <a:avLst/>
+          </a:prstGeom>
+          <a:solidFill>
+            <a:schemeClr val="accent3">
+              <a:lumMod val="60000"/>
+              <a:lumOff val="40000"/>
+            </a:schemeClr>
+          </a:solidFill>
+        </p:spPr>
+        <p:style>
+          <a:lnRef idx="2">
+            <a:schemeClr val="accent1">
+              <a:shade val="50000"/>
+            </a:schemeClr>
+          </a:lnRef>
+          <a:fillRef idx="1">
+            <a:schemeClr val="accent1"/>
+          </a:fillRef>
+          <a:effectRef idx="0">
+            <a:schemeClr val="accent1"/>
+          </a:effectRef>
+          <a:fontRef idx="minor">
+            <a:schemeClr val="lt1"/>
+          </a:fontRef>
+        </p:style>
+        <p:txBody>
+          <a:bodyPr rtlCol="0" anchor="ctr"/>
+          <a:lstStyle/>
+          <a:p>
+            <a:pPr algn="ctr"/>
+            <a:r>
+              <a:rPr lang="en-US" dirty="0" err="1" smtClean="0"/>
+              <a:t>SoftMax</a:t>
+            </a:r>
+            <a:r>
+              <a:rPr lang="en-US" dirty="0" smtClean="0"/>
+              <a:t> </a:t>
+            </a:r>
+            <a:r>
+              <a:rPr lang="en-US" dirty="0" smtClean="0"/>
+              <a:t>Layer (10)</a:t>
+            </a:r>
+            <a:endParaRPr lang="en-US" dirty="0"/>
+          </a:p>
+        </p:txBody>
+      </p:sp>
+      <p:sp>
+        <p:nvSpPr>
+          <p:cNvPr id="36" name="Rectangle 35"/>
+          <p:cNvSpPr/>
+          <p:nvPr/>
+        </p:nvSpPr>
+        <p:spPr>
+          <a:xfrm>
+            <a:off x="3291711" y="3393800"/>
+            <a:ext cx="1440000" cy="288000"/>
+          </a:xfrm>
+          <a:prstGeom prst="rect">
+            <a:avLst/>
+          </a:prstGeom>
+          <a:solidFill>
+            <a:schemeClr val="accent4">
+              <a:lumMod val="60000"/>
+              <a:lumOff val="40000"/>
+            </a:schemeClr>
+          </a:solidFill>
+        </p:spPr>
+        <p:style>
+          <a:lnRef idx="2">
+            <a:schemeClr val="accent1">
+              <a:shade val="50000"/>
+            </a:schemeClr>
+          </a:lnRef>
+          <a:fillRef idx="1">
+            <a:schemeClr val="accent1"/>
+          </a:fillRef>
+          <a:effectRef idx="0">
+            <a:schemeClr val="accent1"/>
+          </a:effectRef>
+          <a:fontRef idx="minor">
+            <a:schemeClr val="lt1"/>
+          </a:fontRef>
+        </p:style>
+        <p:txBody>
+          <a:bodyPr rtlCol="0" anchor="ctr"/>
+          <a:lstStyle/>
+          <a:p>
+            <a:pPr algn="ctr"/>
+            <a:r>
+              <a:rPr lang="en-US" dirty="0" smtClean="0"/>
+              <a:t>Y3 (400)</a:t>
+            </a:r>
+            <a:endParaRPr lang="en-US" dirty="0"/>
+          </a:p>
+        </p:txBody>
+      </p:sp>
+      <p:sp>
+        <p:nvSpPr>
+          <p:cNvPr id="37" name="Rectangle 36"/>
+          <p:cNvSpPr/>
+          <p:nvPr/>
+        </p:nvSpPr>
+        <p:spPr>
+          <a:xfrm>
+            <a:off x="2886711" y="3874106"/>
+            <a:ext cx="2250000" cy="288000"/>
+          </a:xfrm>
+          <a:prstGeom prst="rect">
+            <a:avLst/>
+          </a:prstGeom>
+          <a:solidFill>
+            <a:schemeClr val="accent4">
+              <a:lumMod val="60000"/>
+              <a:lumOff val="40000"/>
+            </a:schemeClr>
+          </a:solidFill>
+        </p:spPr>
+        <p:style>
+          <a:lnRef idx="2">
+            <a:schemeClr val="accent1">
+              <a:shade val="50000"/>
+            </a:schemeClr>
+          </a:lnRef>
+          <a:fillRef idx="1">
+            <a:schemeClr val="accent1"/>
+          </a:fillRef>
+          <a:effectRef idx="0">
+            <a:schemeClr val="accent1"/>
+          </a:effectRef>
+          <a:fontRef idx="minor">
+            <a:schemeClr val="lt1"/>
+          </a:fontRef>
+        </p:style>
+        <p:txBody>
+          <a:bodyPr rtlCol="0" anchor="ctr"/>
+          <a:lstStyle/>
+          <a:p>
+            <a:pPr algn="ctr"/>
+            <a:r>
+              <a:rPr lang="en-US" dirty="0" smtClean="0"/>
+              <a:t>Z3 (625)</a:t>
+            </a:r>
+            <a:endParaRPr lang="en-US" dirty="0"/>
+          </a:p>
+        </p:txBody>
+      </p:sp>
+      <p:sp>
+        <p:nvSpPr>
+          <p:cNvPr id="38" name="Rectangle 37"/>
+          <p:cNvSpPr/>
+          <p:nvPr/>
+        </p:nvSpPr>
+        <p:spPr>
+          <a:xfrm>
+            <a:off x="2391711" y="4354412"/>
             <a:ext cx="3240000" cy="288000"/>
+          </a:xfrm>
+          <a:prstGeom prst="rect">
+            <a:avLst/>
+          </a:prstGeom>
+          <a:solidFill>
+            <a:schemeClr val="accent6">
+              <a:lumMod val="40000"/>
+              <a:lumOff val="60000"/>
+            </a:schemeClr>
+          </a:solidFill>
+        </p:spPr>
+        <p:style>
+          <a:lnRef idx="2">
+            <a:schemeClr val="accent1">
+              <a:shade val="50000"/>
+            </a:schemeClr>
+          </a:lnRef>
+          <a:fillRef idx="1">
+            <a:schemeClr val="accent1"/>
+          </a:fillRef>
+          <a:effectRef idx="0">
+            <a:schemeClr val="accent1"/>
+          </a:effectRef>
+          <a:fontRef idx="minor">
+            <a:schemeClr val="lt1"/>
+          </a:fontRef>
+        </p:style>
+        <p:txBody>
+          <a:bodyPr rtlCol="0" anchor="ctr"/>
+          <a:lstStyle/>
+          <a:p>
+            <a:pPr algn="ctr"/>
+            <a:r>
+              <a:rPr lang="en-US" dirty="0" smtClean="0"/>
+              <a:t>Z2 (900)</a:t>
+            </a:r>
+            <a:endParaRPr lang="en-US" dirty="0"/>
+          </a:p>
+        </p:txBody>
+      </p:sp>
+      <p:sp>
+        <p:nvSpPr>
+          <p:cNvPr id="39" name="Rectangle 38"/>
+          <p:cNvSpPr/>
+          <p:nvPr/>
+        </p:nvSpPr>
+        <p:spPr>
+          <a:xfrm>
+            <a:off x="2600511" y="4834720"/>
+            <a:ext cx="2822400" cy="288000"/>
           </a:xfrm>
           <a:prstGeom prst="rect">
             <a:avLst/>
@@ -3258,220 +4606,407 @@
             <a:pPr algn="ctr"/>
             <a:r>
               <a:rPr lang="en-US" dirty="0" smtClean="0"/>
-              <a:t>Tilde_y1</a:t>
-            </a:r>
-          </a:p>
-        </p:txBody>
-      </p:sp>
-      <p:sp>
-        <p:nvSpPr>
-          <p:cNvPr id="10" name="Rectangle 9"/>
-          <p:cNvSpPr/>
+              <a:t>Z1 (784)</a:t>
+            </a:r>
+            <a:endParaRPr lang="en-US" dirty="0"/>
+          </a:p>
+        </p:txBody>
+      </p:sp>
+      <p:sp>
+        <p:nvSpPr>
+          <p:cNvPr id="40" name="TextBox 39"/>
+          <p:cNvSpPr txBox="1"/>
           <p:nvPr/>
         </p:nvSpPr>
         <p:spPr>
           <a:xfrm>
-            <a:off x="3880234" y="3041053"/>
-            <a:ext cx="2250000" cy="288000"/>
+            <a:off x="2585946" y="5132402"/>
+            <a:ext cx="3008452" cy="369332"/>
           </a:xfrm>
           <a:prstGeom prst="rect">
             <a:avLst/>
           </a:prstGeom>
-          <a:solidFill>
-            <a:schemeClr val="accent6">
-              <a:lumMod val="40000"/>
-              <a:lumOff val="60000"/>
-            </a:schemeClr>
-          </a:solidFill>
+          <a:noFill/>
         </p:spPr>
-        <p:style>
-          <a:lnRef idx="2">
-            <a:schemeClr val="accent1">
-              <a:shade val="50000"/>
-            </a:schemeClr>
-          </a:lnRef>
-          <a:fillRef idx="1">
-            <a:schemeClr val="accent1"/>
-          </a:fillRef>
-          <a:effectRef idx="0">
-            <a:schemeClr val="accent1"/>
-          </a:effectRef>
-          <a:fontRef idx="minor">
-            <a:schemeClr val="lt1"/>
-          </a:fontRef>
-        </p:style>
-        <p:txBody>
-          <a:bodyPr rtlCol="0" anchor="ctr"/>
-          <a:lstStyle/>
-          <a:p>
-            <a:pPr algn="ctr"/>
+        <p:txBody>
+          <a:bodyPr wrap="none" rtlCol="0">
+            <a:spAutoFit/>
+          </a:bodyPr>
+          <a:lstStyle/>
+          <a:p>
             <a:r>
               <a:rPr lang="en-US" dirty="0" smtClean="0"/>
-              <a:t>y2</a:t>
+              <a:t>Deep </a:t>
+            </a:r>
+            <a:r>
+              <a:rPr lang="en-US" dirty="0" err="1" smtClean="0"/>
+              <a:t>Denoising</a:t>
+            </a:r>
+            <a:r>
+              <a:rPr lang="en-US" dirty="0" smtClean="0"/>
+              <a:t> Auto-encoder</a:t>
             </a:r>
             <a:endParaRPr lang="en-US" dirty="0"/>
           </a:p>
         </p:txBody>
       </p:sp>
-      <p:sp>
-        <p:nvSpPr>
-          <p:cNvPr id="11" name="Rectangle 10"/>
+      <p:grpSp>
+        <p:nvGrpSpPr>
+          <p:cNvPr id="41" name="Group 40"/>
+          <p:cNvGrpSpPr/>
+          <p:nvPr/>
+        </p:nvGrpSpPr>
+        <p:grpSpPr>
+          <a:xfrm>
+            <a:off x="2600511" y="1098321"/>
+            <a:ext cx="2822400" cy="572983"/>
+            <a:chOff x="324000" y="2344281"/>
+            <a:chExt cx="2822400" cy="572983"/>
+          </a:xfrm>
+        </p:grpSpPr>
+        <p:sp>
+          <p:nvSpPr>
+            <p:cNvPr id="42" name="Rectangle 41"/>
+            <p:cNvSpPr/>
+            <p:nvPr/>
+          </p:nvSpPr>
+          <p:spPr>
+            <a:xfrm>
+              <a:off x="324000" y="2344281"/>
+              <a:ext cx="2822400" cy="288000"/>
+            </a:xfrm>
+            <a:prstGeom prst="rect">
+              <a:avLst/>
+            </a:prstGeom>
+            <a:solidFill>
+              <a:schemeClr val="accent1">
+                <a:lumMod val="60000"/>
+                <a:lumOff val="40000"/>
+              </a:schemeClr>
+            </a:solidFill>
+          </p:spPr>
+          <p:style>
+            <a:lnRef idx="2">
+              <a:schemeClr val="accent1">
+                <a:shade val="50000"/>
+              </a:schemeClr>
+            </a:lnRef>
+            <a:fillRef idx="1">
+              <a:schemeClr val="accent1"/>
+            </a:fillRef>
+            <a:effectRef idx="0">
+              <a:schemeClr val="accent1"/>
+            </a:effectRef>
+            <a:fontRef idx="minor">
+              <a:schemeClr val="lt1"/>
+            </a:fontRef>
+          </p:style>
+          <p:txBody>
+            <a:bodyPr rtlCol="0" anchor="ctr"/>
+            <a:lstStyle/>
+            <a:p>
+              <a:pPr algn="ctr"/>
+              <a:r>
+                <a:rPr lang="en-US" dirty="0" smtClean="0"/>
+                <a:t>X (784)</a:t>
+              </a:r>
+              <a:endParaRPr lang="en-US" dirty="0"/>
+            </a:p>
+          </p:txBody>
+        </p:sp>
+        <p:sp>
+          <p:nvSpPr>
+            <p:cNvPr id="43" name="Rectangle 42"/>
+            <p:cNvSpPr/>
+            <p:nvPr/>
+          </p:nvSpPr>
+          <p:spPr>
+            <a:xfrm>
+              <a:off x="324000" y="2629264"/>
+              <a:ext cx="2822400" cy="288000"/>
+            </a:xfrm>
+            <a:prstGeom prst="rect">
+              <a:avLst/>
+            </a:prstGeom>
+            <a:solidFill>
+              <a:schemeClr val="accent1">
+                <a:lumMod val="60000"/>
+                <a:lumOff val="40000"/>
+              </a:schemeClr>
+            </a:solidFill>
+          </p:spPr>
+          <p:style>
+            <a:lnRef idx="2">
+              <a:schemeClr val="accent1">
+                <a:shade val="50000"/>
+              </a:schemeClr>
+            </a:lnRef>
+            <a:fillRef idx="1">
+              <a:schemeClr val="accent1"/>
+            </a:fillRef>
+            <a:effectRef idx="0">
+              <a:schemeClr val="accent1"/>
+            </a:effectRef>
+            <a:fontRef idx="minor">
+              <a:schemeClr val="lt1"/>
+            </a:fontRef>
+          </p:style>
+          <p:txBody>
+            <a:bodyPr rtlCol="0" anchor="ctr"/>
+            <a:lstStyle/>
+            <a:p>
+              <a:pPr algn="ctr"/>
+              <a:r>
+                <a:rPr lang="en-US" dirty="0" err="1" smtClean="0"/>
+                <a:t>Tilde_x</a:t>
+              </a:r>
+              <a:r>
+                <a:rPr lang="en-US" dirty="0" smtClean="0"/>
+                <a:t> (784)</a:t>
+              </a:r>
+              <a:endParaRPr lang="en-US" dirty="0"/>
+            </a:p>
+          </p:txBody>
+        </p:sp>
+      </p:grpSp>
+      <p:grpSp>
+        <p:nvGrpSpPr>
+          <p:cNvPr id="44" name="Group 43"/>
+          <p:cNvGrpSpPr/>
+          <p:nvPr/>
+        </p:nvGrpSpPr>
+        <p:grpSpPr>
+          <a:xfrm>
+            <a:off x="2391711" y="1863610"/>
+            <a:ext cx="3240000" cy="572789"/>
+            <a:chOff x="3385234" y="2357175"/>
+            <a:chExt cx="3240000" cy="572789"/>
+          </a:xfrm>
+        </p:grpSpPr>
+        <p:sp>
+          <p:nvSpPr>
+            <p:cNvPr id="45" name="Rectangle 44"/>
+            <p:cNvSpPr/>
+            <p:nvPr/>
+          </p:nvSpPr>
+          <p:spPr>
+            <a:xfrm>
+              <a:off x="3385234" y="2357175"/>
+              <a:ext cx="3240000" cy="288000"/>
+            </a:xfrm>
+            <a:prstGeom prst="rect">
+              <a:avLst/>
+            </a:prstGeom>
+            <a:solidFill>
+              <a:schemeClr val="accent2">
+                <a:lumMod val="60000"/>
+                <a:lumOff val="40000"/>
+              </a:schemeClr>
+            </a:solidFill>
+          </p:spPr>
+          <p:style>
+            <a:lnRef idx="2">
+              <a:schemeClr val="accent1">
+                <a:shade val="50000"/>
+              </a:schemeClr>
+            </a:lnRef>
+            <a:fillRef idx="1">
+              <a:schemeClr val="accent1"/>
+            </a:fillRef>
+            <a:effectRef idx="0">
+              <a:schemeClr val="accent1"/>
+            </a:effectRef>
+            <a:fontRef idx="minor">
+              <a:schemeClr val="lt1"/>
+            </a:fontRef>
+          </p:style>
+          <p:txBody>
+            <a:bodyPr rtlCol="0" anchor="ctr"/>
+            <a:lstStyle/>
+            <a:p>
+              <a:pPr algn="ctr"/>
+              <a:r>
+                <a:rPr lang="en-US" dirty="0" smtClean="0"/>
+                <a:t>Y1 (900)</a:t>
+              </a:r>
+              <a:endParaRPr lang="en-US" dirty="0"/>
+            </a:p>
+          </p:txBody>
+        </p:sp>
+        <p:sp>
+          <p:nvSpPr>
+            <p:cNvPr id="46" name="Rectangle 45"/>
+            <p:cNvSpPr/>
+            <p:nvPr/>
+          </p:nvSpPr>
+          <p:spPr>
+            <a:xfrm>
+              <a:off x="3385234" y="2641964"/>
+              <a:ext cx="3240000" cy="288000"/>
+            </a:xfrm>
+            <a:prstGeom prst="rect">
+              <a:avLst/>
+            </a:prstGeom>
+            <a:solidFill>
+              <a:schemeClr val="accent2">
+                <a:lumMod val="60000"/>
+                <a:lumOff val="40000"/>
+              </a:schemeClr>
+            </a:solidFill>
+          </p:spPr>
+          <p:style>
+            <a:lnRef idx="2">
+              <a:schemeClr val="accent1">
+                <a:shade val="50000"/>
+              </a:schemeClr>
+            </a:lnRef>
+            <a:fillRef idx="1">
+              <a:schemeClr val="accent1"/>
+            </a:fillRef>
+            <a:effectRef idx="0">
+              <a:schemeClr val="accent1"/>
+            </a:effectRef>
+            <a:fontRef idx="minor">
+              <a:schemeClr val="lt1"/>
+            </a:fontRef>
+          </p:style>
+          <p:txBody>
+            <a:bodyPr rtlCol="0" anchor="ctr"/>
+            <a:lstStyle/>
+            <a:p>
+              <a:pPr algn="ctr"/>
+              <a:r>
+                <a:rPr lang="en-US" dirty="0" smtClean="0"/>
+                <a:t>Tilde_y1 (900)</a:t>
+              </a:r>
+            </a:p>
+          </p:txBody>
+        </p:sp>
+      </p:grpSp>
+      <p:grpSp>
+        <p:nvGrpSpPr>
+          <p:cNvPr id="47" name="Group 46"/>
+          <p:cNvGrpSpPr/>
+          <p:nvPr/>
+        </p:nvGrpSpPr>
+        <p:grpSpPr>
+          <a:xfrm>
+            <a:off x="2885870" y="2628705"/>
+            <a:ext cx="2251682" cy="572789"/>
+            <a:chOff x="6809672" y="2357175"/>
+            <a:chExt cx="2251682" cy="572789"/>
+          </a:xfrm>
+        </p:grpSpPr>
+        <p:sp>
+          <p:nvSpPr>
+            <p:cNvPr id="48" name="Rectangle 47"/>
+            <p:cNvSpPr/>
+            <p:nvPr/>
+          </p:nvSpPr>
+          <p:spPr>
+            <a:xfrm>
+              <a:off x="6811354" y="2357175"/>
+              <a:ext cx="2250000" cy="288000"/>
+            </a:xfrm>
+            <a:prstGeom prst="rect">
+              <a:avLst/>
+            </a:prstGeom>
+            <a:solidFill>
+              <a:schemeClr val="accent6">
+                <a:lumMod val="40000"/>
+                <a:lumOff val="60000"/>
+              </a:schemeClr>
+            </a:solidFill>
+          </p:spPr>
+          <p:style>
+            <a:lnRef idx="2">
+              <a:schemeClr val="accent1">
+                <a:shade val="50000"/>
+              </a:schemeClr>
+            </a:lnRef>
+            <a:fillRef idx="1">
+              <a:schemeClr val="accent1"/>
+            </a:fillRef>
+            <a:effectRef idx="0">
+              <a:schemeClr val="accent1"/>
+            </a:effectRef>
+            <a:fontRef idx="minor">
+              <a:schemeClr val="lt1"/>
+            </a:fontRef>
+          </p:style>
+          <p:txBody>
+            <a:bodyPr rtlCol="0" anchor="ctr"/>
+            <a:lstStyle/>
+            <a:p>
+              <a:pPr algn="ctr"/>
+              <a:r>
+                <a:rPr lang="en-US" dirty="0" smtClean="0"/>
+                <a:t>Y2 (625)</a:t>
+              </a:r>
+              <a:endParaRPr lang="en-US" dirty="0"/>
+            </a:p>
+          </p:txBody>
+        </p:sp>
+        <p:sp>
+          <p:nvSpPr>
+            <p:cNvPr id="49" name="Rectangle 48"/>
+            <p:cNvSpPr/>
+            <p:nvPr/>
+          </p:nvSpPr>
+          <p:spPr>
+            <a:xfrm>
+              <a:off x="6809672" y="2641964"/>
+              <a:ext cx="2250000" cy="288000"/>
+            </a:xfrm>
+            <a:prstGeom prst="rect">
+              <a:avLst/>
+            </a:prstGeom>
+            <a:solidFill>
+              <a:schemeClr val="accent6">
+                <a:lumMod val="40000"/>
+                <a:lumOff val="60000"/>
+              </a:schemeClr>
+            </a:solidFill>
+          </p:spPr>
+          <p:style>
+            <a:lnRef idx="2">
+              <a:schemeClr val="accent1">
+                <a:shade val="50000"/>
+              </a:schemeClr>
+            </a:lnRef>
+            <a:fillRef idx="1">
+              <a:schemeClr val="accent1"/>
+            </a:fillRef>
+            <a:effectRef idx="0">
+              <a:schemeClr val="accent1"/>
+            </a:effectRef>
+            <a:fontRef idx="minor">
+              <a:schemeClr val="lt1"/>
+            </a:fontRef>
+          </p:style>
+          <p:txBody>
+            <a:bodyPr rtlCol="0" anchor="ctr"/>
+            <a:lstStyle/>
+            <a:p>
+              <a:pPr algn="ctr"/>
+              <a:r>
+                <a:rPr lang="en-US" dirty="0" smtClean="0"/>
+                <a:t>Tilde_y2 (625)</a:t>
+              </a:r>
+              <a:endParaRPr lang="en-US" dirty="0"/>
+            </a:p>
+          </p:txBody>
+        </p:sp>
+      </p:grpSp>
+      <p:sp>
+        <p:nvSpPr>
+          <p:cNvPr id="50" name="Rectangle 49"/>
           <p:cNvSpPr/>
           <p:nvPr/>
         </p:nvSpPr>
         <p:spPr>
           <a:xfrm>
-            <a:off x="3385234" y="3440141"/>
-            <a:ext cx="3240000" cy="288000"/>
-          </a:xfrm>
-          <a:prstGeom prst="rect">
-            <a:avLst/>
-          </a:prstGeom>
-          <a:solidFill>
-            <a:schemeClr val="accent6">
-              <a:lumMod val="40000"/>
-              <a:lumOff val="60000"/>
-            </a:schemeClr>
-          </a:solidFill>
-        </p:spPr>
-        <p:style>
-          <a:lnRef idx="2">
-            <a:schemeClr val="accent1">
-              <a:shade val="50000"/>
-            </a:schemeClr>
-          </a:lnRef>
-          <a:fillRef idx="1">
-            <a:schemeClr val="accent1"/>
-          </a:fillRef>
-          <a:effectRef idx="0">
-            <a:schemeClr val="accent1"/>
-          </a:effectRef>
-          <a:fontRef idx="minor">
-            <a:schemeClr val="lt1"/>
-          </a:fontRef>
-        </p:style>
-        <p:txBody>
-          <a:bodyPr rtlCol="0" anchor="ctr"/>
-          <a:lstStyle/>
-          <a:p>
-            <a:pPr algn="ctr"/>
-            <a:r>
-              <a:rPr lang="en-US" dirty="0" smtClean="0"/>
-              <a:t>z2</a:t>
-            </a:r>
-            <a:endParaRPr lang="en-US" dirty="0"/>
-          </a:p>
-        </p:txBody>
-      </p:sp>
-      <p:sp>
-        <p:nvSpPr>
-          <p:cNvPr id="12" name="Rectangle 11"/>
-          <p:cNvSpPr/>
-          <p:nvPr/>
-        </p:nvSpPr>
-        <p:spPr>
-          <a:xfrm>
-            <a:off x="6798654" y="2242875"/>
-            <a:ext cx="2250000" cy="288000"/>
-          </a:xfrm>
-          <a:prstGeom prst="rect">
-            <a:avLst/>
-          </a:prstGeom>
-          <a:solidFill>
-            <a:schemeClr val="accent6">
-              <a:lumMod val="40000"/>
-              <a:lumOff val="60000"/>
-            </a:schemeClr>
-          </a:solidFill>
-        </p:spPr>
-        <p:style>
-          <a:lnRef idx="2">
-            <a:schemeClr val="accent1">
-              <a:shade val="50000"/>
-            </a:schemeClr>
-          </a:lnRef>
-          <a:fillRef idx="1">
-            <a:schemeClr val="accent1"/>
-          </a:fillRef>
-          <a:effectRef idx="0">
-            <a:schemeClr val="accent1"/>
-          </a:effectRef>
-          <a:fontRef idx="minor">
-            <a:schemeClr val="lt1"/>
-          </a:fontRef>
-        </p:style>
-        <p:txBody>
-          <a:bodyPr rtlCol="0" anchor="ctr"/>
-          <a:lstStyle/>
-          <a:p>
-            <a:pPr algn="ctr"/>
-            <a:r>
-              <a:rPr lang="en-US" dirty="0" smtClean="0"/>
-              <a:t>y2</a:t>
-            </a:r>
-            <a:endParaRPr lang="en-US" dirty="0"/>
-          </a:p>
-        </p:txBody>
-      </p:sp>
-      <p:sp>
-        <p:nvSpPr>
-          <p:cNvPr id="14" name="Rectangle 13"/>
-          <p:cNvSpPr/>
-          <p:nvPr/>
-        </p:nvSpPr>
-        <p:spPr>
-          <a:xfrm>
-            <a:off x="6809672" y="2641964"/>
-            <a:ext cx="2250000" cy="288000"/>
-          </a:xfrm>
-          <a:prstGeom prst="rect">
-            <a:avLst/>
-          </a:prstGeom>
-          <a:solidFill>
-            <a:schemeClr val="accent6">
-              <a:lumMod val="40000"/>
-              <a:lumOff val="60000"/>
-            </a:schemeClr>
-          </a:solidFill>
-        </p:spPr>
-        <p:style>
-          <a:lnRef idx="2">
-            <a:schemeClr val="accent1">
-              <a:shade val="50000"/>
-            </a:schemeClr>
-          </a:lnRef>
-          <a:fillRef idx="1">
-            <a:schemeClr val="accent1"/>
-          </a:fillRef>
-          <a:effectRef idx="0">
-            <a:schemeClr val="accent1"/>
-          </a:effectRef>
-          <a:fontRef idx="minor">
-            <a:schemeClr val="lt1"/>
-          </a:fontRef>
-        </p:style>
-        <p:txBody>
-          <a:bodyPr rtlCol="0" anchor="ctr"/>
-          <a:lstStyle/>
-          <a:p>
-            <a:pPr algn="ctr"/>
-            <a:r>
-              <a:rPr lang="en-US" dirty="0" smtClean="0"/>
-              <a:t>Tilde_y2</a:t>
-            </a:r>
-            <a:endParaRPr lang="en-US" dirty="0"/>
-          </a:p>
-        </p:txBody>
-      </p:sp>
-      <p:sp>
-        <p:nvSpPr>
-          <p:cNvPr id="15" name="Rectangle 14"/>
-          <p:cNvSpPr/>
-          <p:nvPr/>
-        </p:nvSpPr>
-        <p:spPr>
-          <a:xfrm>
-            <a:off x="7228960" y="3041053"/>
+            <a:off x="7482711" y="3759973"/>
             <a:ext cx="1440000" cy="288000"/>
           </a:xfrm>
           <a:prstGeom prst="rect">
@@ -3507,693 +5042,364 @@
             <a:pPr algn="ctr"/>
             <a:r>
               <a:rPr lang="en-US" dirty="0" smtClean="0"/>
-              <a:t>y3</a:t>
+              <a:t>Y3 (400)</a:t>
             </a:r>
             <a:endParaRPr lang="en-US" dirty="0"/>
           </a:p>
         </p:txBody>
       </p:sp>
-      <p:sp>
-        <p:nvSpPr>
-          <p:cNvPr id="16" name="Rectangle 15"/>
-          <p:cNvSpPr/>
+      <p:grpSp>
+        <p:nvGrpSpPr>
+          <p:cNvPr id="51" name="Group 50"/>
+          <p:cNvGrpSpPr/>
           <p:nvPr/>
-        </p:nvSpPr>
-        <p:spPr>
-          <a:xfrm>
-            <a:off x="6823960" y="3440141"/>
-            <a:ext cx="2250000" cy="288000"/>
-          </a:xfrm>
-          <a:prstGeom prst="rect">
-            <a:avLst/>
-          </a:prstGeom>
-          <a:solidFill>
-            <a:schemeClr val="accent4">
-              <a:lumMod val="60000"/>
-              <a:lumOff val="40000"/>
-            </a:schemeClr>
-          </a:solidFill>
-        </p:spPr>
-        <p:style>
-          <a:lnRef idx="2">
-            <a:schemeClr val="accent1">
-              <a:shade val="50000"/>
-            </a:schemeClr>
-          </a:lnRef>
-          <a:fillRef idx="1">
-            <a:schemeClr val="accent1"/>
-          </a:fillRef>
-          <a:effectRef idx="0">
-            <a:schemeClr val="accent1"/>
-          </a:effectRef>
-          <a:fontRef idx="minor">
-            <a:schemeClr val="lt1"/>
-          </a:fontRef>
-        </p:style>
-        <p:txBody>
-          <a:bodyPr rtlCol="0" anchor="ctr"/>
-          <a:lstStyle/>
-          <a:p>
-            <a:pPr algn="ctr"/>
-            <a:r>
-              <a:rPr lang="en-US" dirty="0" smtClean="0"/>
-              <a:t>z3</a:t>
-            </a:r>
-            <a:endParaRPr lang="en-US" dirty="0"/>
-          </a:p>
-        </p:txBody>
-      </p:sp>
-      <p:sp>
-        <p:nvSpPr>
-          <p:cNvPr id="17" name="TextBox 16"/>
-          <p:cNvSpPr txBox="1"/>
+        </p:nvGrpSpPr>
+        <p:grpSpPr>
+          <a:xfrm>
+            <a:off x="6791511" y="1407821"/>
+            <a:ext cx="2822400" cy="572983"/>
+            <a:chOff x="324000" y="2344281"/>
+            <a:chExt cx="2822400" cy="572983"/>
+          </a:xfrm>
+        </p:grpSpPr>
+        <p:sp>
+          <p:nvSpPr>
+            <p:cNvPr id="52" name="Rectangle 51"/>
+            <p:cNvSpPr/>
+            <p:nvPr/>
+          </p:nvSpPr>
+          <p:spPr>
+            <a:xfrm>
+              <a:off x="324000" y="2344281"/>
+              <a:ext cx="2822400" cy="288000"/>
+            </a:xfrm>
+            <a:prstGeom prst="rect">
+              <a:avLst/>
+            </a:prstGeom>
+            <a:solidFill>
+              <a:schemeClr val="accent1">
+                <a:lumMod val="60000"/>
+                <a:lumOff val="40000"/>
+              </a:schemeClr>
+            </a:solidFill>
+          </p:spPr>
+          <p:style>
+            <a:lnRef idx="2">
+              <a:schemeClr val="accent1">
+                <a:shade val="50000"/>
+              </a:schemeClr>
+            </a:lnRef>
+            <a:fillRef idx="1">
+              <a:schemeClr val="accent1"/>
+            </a:fillRef>
+            <a:effectRef idx="0">
+              <a:schemeClr val="accent1"/>
+            </a:effectRef>
+            <a:fontRef idx="minor">
+              <a:schemeClr val="lt1"/>
+            </a:fontRef>
+          </p:style>
+          <p:txBody>
+            <a:bodyPr rtlCol="0" anchor="ctr"/>
+            <a:lstStyle/>
+            <a:p>
+              <a:pPr algn="ctr"/>
+              <a:r>
+                <a:rPr lang="en-US" dirty="0" smtClean="0"/>
+                <a:t>X (784)</a:t>
+              </a:r>
+              <a:endParaRPr lang="en-US" dirty="0"/>
+            </a:p>
+          </p:txBody>
+        </p:sp>
+        <p:sp>
+          <p:nvSpPr>
+            <p:cNvPr id="53" name="Rectangle 52"/>
+            <p:cNvSpPr/>
+            <p:nvPr/>
+          </p:nvSpPr>
+          <p:spPr>
+            <a:xfrm>
+              <a:off x="324000" y="2629264"/>
+              <a:ext cx="2822400" cy="288000"/>
+            </a:xfrm>
+            <a:prstGeom prst="rect">
+              <a:avLst/>
+            </a:prstGeom>
+            <a:solidFill>
+              <a:schemeClr val="accent1">
+                <a:lumMod val="60000"/>
+                <a:lumOff val="40000"/>
+              </a:schemeClr>
+            </a:solidFill>
+          </p:spPr>
+          <p:style>
+            <a:lnRef idx="2">
+              <a:schemeClr val="accent1">
+                <a:shade val="50000"/>
+              </a:schemeClr>
+            </a:lnRef>
+            <a:fillRef idx="1">
+              <a:schemeClr val="accent1"/>
+            </a:fillRef>
+            <a:effectRef idx="0">
+              <a:schemeClr val="accent1"/>
+            </a:effectRef>
+            <a:fontRef idx="minor">
+              <a:schemeClr val="lt1"/>
+            </a:fontRef>
+          </p:style>
+          <p:txBody>
+            <a:bodyPr rtlCol="0" anchor="ctr"/>
+            <a:lstStyle/>
+            <a:p>
+              <a:pPr algn="ctr"/>
+              <a:r>
+                <a:rPr lang="en-US" dirty="0" err="1" smtClean="0"/>
+                <a:t>Tilde_x</a:t>
+              </a:r>
+              <a:r>
+                <a:rPr lang="en-US" dirty="0" smtClean="0"/>
+                <a:t> (784)</a:t>
+              </a:r>
+              <a:endParaRPr lang="en-US" dirty="0"/>
+            </a:p>
+          </p:txBody>
+        </p:sp>
+      </p:grpSp>
+      <p:grpSp>
+        <p:nvGrpSpPr>
+          <p:cNvPr id="54" name="Group 53"/>
+          <p:cNvGrpSpPr/>
           <p:nvPr/>
-        </p:nvSpPr>
-        <p:spPr>
-          <a:xfrm>
-            <a:off x="1228729" y="3771898"/>
-            <a:ext cx="2286000" cy="369332"/>
-          </a:xfrm>
-          <a:prstGeom prst="rect">
-            <a:avLst/>
-          </a:prstGeom>
-          <a:noFill/>
-        </p:spPr>
-        <p:txBody>
-          <a:bodyPr wrap="square" rtlCol="0">
-            <a:spAutoFit/>
-          </a:bodyPr>
-          <a:lstStyle/>
-          <a:p>
-            <a:r>
-              <a:rPr lang="en-US" altLang="zh-CN" smtClean="0"/>
-              <a:t>Train y1</a:t>
-            </a:r>
-            <a:endParaRPr lang="en-US"/>
-          </a:p>
-        </p:txBody>
-      </p:sp>
-      <p:sp>
-        <p:nvSpPr>
-          <p:cNvPr id="18" name="TextBox 17"/>
-          <p:cNvSpPr txBox="1"/>
+        </p:nvGrpSpPr>
+        <p:grpSpPr>
+          <a:xfrm>
+            <a:off x="6582711" y="2192001"/>
+            <a:ext cx="3240000" cy="572789"/>
+            <a:chOff x="3385234" y="2357175"/>
+            <a:chExt cx="3240000" cy="572789"/>
+          </a:xfrm>
+        </p:grpSpPr>
+        <p:sp>
+          <p:nvSpPr>
+            <p:cNvPr id="55" name="Rectangle 54"/>
+            <p:cNvSpPr/>
+            <p:nvPr/>
+          </p:nvSpPr>
+          <p:spPr>
+            <a:xfrm>
+              <a:off x="3385234" y="2357175"/>
+              <a:ext cx="3240000" cy="288000"/>
+            </a:xfrm>
+            <a:prstGeom prst="rect">
+              <a:avLst/>
+            </a:prstGeom>
+            <a:solidFill>
+              <a:schemeClr val="accent2">
+                <a:lumMod val="60000"/>
+                <a:lumOff val="40000"/>
+              </a:schemeClr>
+            </a:solidFill>
+          </p:spPr>
+          <p:style>
+            <a:lnRef idx="2">
+              <a:schemeClr val="accent1">
+                <a:shade val="50000"/>
+              </a:schemeClr>
+            </a:lnRef>
+            <a:fillRef idx="1">
+              <a:schemeClr val="accent1"/>
+            </a:fillRef>
+            <a:effectRef idx="0">
+              <a:schemeClr val="accent1"/>
+            </a:effectRef>
+            <a:fontRef idx="minor">
+              <a:schemeClr val="lt1"/>
+            </a:fontRef>
+          </p:style>
+          <p:txBody>
+            <a:bodyPr rtlCol="0" anchor="ctr"/>
+            <a:lstStyle/>
+            <a:p>
+              <a:pPr algn="ctr"/>
+              <a:r>
+                <a:rPr lang="en-US" dirty="0" smtClean="0"/>
+                <a:t>Y1 (900)</a:t>
+              </a:r>
+              <a:endParaRPr lang="en-US" dirty="0"/>
+            </a:p>
+          </p:txBody>
+        </p:sp>
+        <p:sp>
+          <p:nvSpPr>
+            <p:cNvPr id="56" name="Rectangle 55"/>
+            <p:cNvSpPr/>
+            <p:nvPr/>
+          </p:nvSpPr>
+          <p:spPr>
+            <a:xfrm>
+              <a:off x="3385234" y="2641964"/>
+              <a:ext cx="3240000" cy="288000"/>
+            </a:xfrm>
+            <a:prstGeom prst="rect">
+              <a:avLst/>
+            </a:prstGeom>
+            <a:solidFill>
+              <a:schemeClr val="accent2">
+                <a:lumMod val="60000"/>
+                <a:lumOff val="40000"/>
+              </a:schemeClr>
+            </a:solidFill>
+          </p:spPr>
+          <p:style>
+            <a:lnRef idx="2">
+              <a:schemeClr val="accent1">
+                <a:shade val="50000"/>
+              </a:schemeClr>
+            </a:lnRef>
+            <a:fillRef idx="1">
+              <a:schemeClr val="accent1"/>
+            </a:fillRef>
+            <a:effectRef idx="0">
+              <a:schemeClr val="accent1"/>
+            </a:effectRef>
+            <a:fontRef idx="minor">
+              <a:schemeClr val="lt1"/>
+            </a:fontRef>
+          </p:style>
+          <p:txBody>
+            <a:bodyPr rtlCol="0" anchor="ctr"/>
+            <a:lstStyle/>
+            <a:p>
+              <a:pPr algn="ctr"/>
+              <a:r>
+                <a:rPr lang="en-US" dirty="0" smtClean="0"/>
+                <a:t>Tilde_y1 (900)</a:t>
+              </a:r>
+            </a:p>
+          </p:txBody>
+        </p:sp>
+      </p:grpSp>
+      <p:grpSp>
+        <p:nvGrpSpPr>
+          <p:cNvPr id="57" name="Group 56"/>
+          <p:cNvGrpSpPr/>
           <p:nvPr/>
-        </p:nvSpPr>
-        <p:spPr>
-          <a:xfrm>
-            <a:off x="4552899" y="3742428"/>
-            <a:ext cx="2286000" cy="369332"/>
-          </a:xfrm>
-          <a:prstGeom prst="rect">
-            <a:avLst/>
-          </a:prstGeom>
-          <a:noFill/>
-        </p:spPr>
-        <p:txBody>
-          <a:bodyPr wrap="square" rtlCol="0">
-            <a:spAutoFit/>
-          </a:bodyPr>
-          <a:lstStyle/>
-          <a:p>
-            <a:r>
-              <a:rPr lang="en-US" altLang="zh-CN" smtClean="0"/>
-              <a:t>Train y2</a:t>
-            </a:r>
-            <a:endParaRPr lang="en-US"/>
-          </a:p>
-        </p:txBody>
-      </p:sp>
-      <p:sp>
-        <p:nvSpPr>
-          <p:cNvPr id="19" name="TextBox 18"/>
-          <p:cNvSpPr txBox="1"/>
-          <p:nvPr/>
-        </p:nvSpPr>
-        <p:spPr>
-          <a:xfrm>
-            <a:off x="7473786" y="3728141"/>
-            <a:ext cx="1070139" cy="369332"/>
-          </a:xfrm>
-          <a:prstGeom prst="rect">
-            <a:avLst/>
-          </a:prstGeom>
-          <a:noFill/>
-        </p:spPr>
-        <p:txBody>
-          <a:bodyPr wrap="square" rtlCol="0">
-            <a:spAutoFit/>
-          </a:bodyPr>
-          <a:lstStyle/>
-          <a:p>
-            <a:r>
-              <a:rPr lang="en-US" altLang="zh-CN" dirty="0" smtClean="0"/>
-              <a:t>Train y3</a:t>
-            </a:r>
-            <a:endParaRPr lang="en-US" dirty="0"/>
-          </a:p>
-        </p:txBody>
-      </p:sp>
-      <p:sp>
-        <p:nvSpPr>
-          <p:cNvPr id="23" name="Rectangle 22"/>
-          <p:cNvSpPr/>
-          <p:nvPr/>
-        </p:nvSpPr>
-        <p:spPr>
-          <a:xfrm>
-            <a:off x="10420499" y="985557"/>
-            <a:ext cx="900000" cy="288000"/>
-          </a:xfrm>
-          <a:prstGeom prst="rect">
-            <a:avLst/>
-          </a:prstGeom>
-          <a:solidFill>
-            <a:schemeClr val="accent1">
-              <a:lumMod val="60000"/>
-              <a:lumOff val="40000"/>
-            </a:schemeClr>
-          </a:solidFill>
-        </p:spPr>
-        <p:style>
-          <a:lnRef idx="2">
-            <a:schemeClr val="accent1">
-              <a:shade val="50000"/>
-            </a:schemeClr>
-          </a:lnRef>
-          <a:fillRef idx="1">
-            <a:schemeClr val="accent1"/>
-          </a:fillRef>
-          <a:effectRef idx="0">
-            <a:schemeClr val="accent1"/>
-          </a:effectRef>
-          <a:fontRef idx="minor">
-            <a:schemeClr val="lt1"/>
-          </a:fontRef>
-        </p:style>
-        <p:txBody>
-          <a:bodyPr rtlCol="0" anchor="ctr"/>
-          <a:lstStyle/>
-          <a:p>
-            <a:pPr algn="ctr"/>
-            <a:r>
-              <a:rPr lang="en-US" dirty="0" smtClean="0"/>
-              <a:t>x</a:t>
-            </a:r>
-            <a:endParaRPr lang="en-US" dirty="0"/>
-          </a:p>
-        </p:txBody>
-      </p:sp>
-      <p:sp>
-        <p:nvSpPr>
-          <p:cNvPr id="24" name="Rectangle 23"/>
-          <p:cNvSpPr/>
-          <p:nvPr/>
-        </p:nvSpPr>
-        <p:spPr>
-          <a:xfrm>
-            <a:off x="10420498" y="1397238"/>
-            <a:ext cx="900000" cy="288000"/>
-          </a:xfrm>
-          <a:prstGeom prst="rect">
-            <a:avLst/>
-          </a:prstGeom>
-          <a:solidFill>
-            <a:schemeClr val="accent1">
-              <a:lumMod val="60000"/>
-              <a:lumOff val="40000"/>
-            </a:schemeClr>
-          </a:solidFill>
-        </p:spPr>
-        <p:style>
-          <a:lnRef idx="2">
-            <a:schemeClr val="accent1">
-              <a:shade val="50000"/>
-            </a:schemeClr>
-          </a:lnRef>
-          <a:fillRef idx="1">
-            <a:schemeClr val="accent1"/>
-          </a:fillRef>
-          <a:effectRef idx="0">
-            <a:schemeClr val="accent1"/>
-          </a:effectRef>
-          <a:fontRef idx="minor">
-            <a:schemeClr val="lt1"/>
-          </a:fontRef>
-        </p:style>
-        <p:txBody>
-          <a:bodyPr rtlCol="0" anchor="ctr"/>
-          <a:lstStyle/>
-          <a:p>
-            <a:pPr algn="ctr"/>
-            <a:r>
-              <a:rPr lang="en-US" dirty="0" err="1" smtClean="0"/>
-              <a:t>Tilde_x</a:t>
-            </a:r>
-            <a:endParaRPr lang="en-US" dirty="0"/>
-          </a:p>
-        </p:txBody>
-      </p:sp>
-      <p:sp>
-        <p:nvSpPr>
-          <p:cNvPr id="25" name="Rectangle 24"/>
-          <p:cNvSpPr/>
-          <p:nvPr/>
-        </p:nvSpPr>
-        <p:spPr>
-          <a:xfrm>
-            <a:off x="9250498" y="1808919"/>
-            <a:ext cx="3240000" cy="288000"/>
-          </a:xfrm>
-          <a:prstGeom prst="rect">
-            <a:avLst/>
-          </a:prstGeom>
-          <a:solidFill>
-            <a:schemeClr val="accent2">
-              <a:lumMod val="60000"/>
-              <a:lumOff val="40000"/>
-            </a:schemeClr>
-          </a:solidFill>
-        </p:spPr>
-        <p:style>
-          <a:lnRef idx="2">
-            <a:schemeClr val="accent1">
-              <a:shade val="50000"/>
-            </a:schemeClr>
-          </a:lnRef>
-          <a:fillRef idx="1">
-            <a:schemeClr val="accent1"/>
-          </a:fillRef>
-          <a:effectRef idx="0">
-            <a:schemeClr val="accent1"/>
-          </a:effectRef>
-          <a:fontRef idx="minor">
-            <a:schemeClr val="lt1"/>
-          </a:fontRef>
-        </p:style>
-        <p:txBody>
-          <a:bodyPr rtlCol="0" anchor="ctr"/>
-          <a:lstStyle/>
-          <a:p>
-            <a:pPr algn="ctr"/>
-            <a:r>
-              <a:rPr lang="en-US" dirty="0" smtClean="0"/>
-              <a:t>y1</a:t>
-            </a:r>
-            <a:endParaRPr lang="en-US" dirty="0"/>
-          </a:p>
-        </p:txBody>
-      </p:sp>
-      <p:sp>
-        <p:nvSpPr>
-          <p:cNvPr id="26" name="Rectangle 25"/>
-          <p:cNvSpPr/>
-          <p:nvPr/>
-        </p:nvSpPr>
-        <p:spPr>
-          <a:xfrm>
-            <a:off x="9250498" y="2220600"/>
-            <a:ext cx="3240000" cy="288000"/>
-          </a:xfrm>
-          <a:prstGeom prst="rect">
-            <a:avLst/>
-          </a:prstGeom>
-          <a:solidFill>
-            <a:schemeClr val="accent2">
-              <a:lumMod val="60000"/>
-              <a:lumOff val="40000"/>
-            </a:schemeClr>
-          </a:solidFill>
-        </p:spPr>
-        <p:style>
-          <a:lnRef idx="2">
-            <a:schemeClr val="accent1">
-              <a:shade val="50000"/>
-            </a:schemeClr>
-          </a:lnRef>
-          <a:fillRef idx="1">
-            <a:schemeClr val="accent1"/>
-          </a:fillRef>
-          <a:effectRef idx="0">
-            <a:schemeClr val="accent1"/>
-          </a:effectRef>
-          <a:fontRef idx="minor">
-            <a:schemeClr val="lt1"/>
-          </a:fontRef>
-        </p:style>
-        <p:txBody>
-          <a:bodyPr rtlCol="0" anchor="ctr"/>
-          <a:lstStyle/>
-          <a:p>
-            <a:pPr algn="ctr"/>
-            <a:r>
-              <a:rPr lang="en-US" dirty="0" smtClean="0"/>
-              <a:t>Tilde_y1</a:t>
-            </a:r>
-          </a:p>
-        </p:txBody>
-      </p:sp>
-      <p:sp>
-        <p:nvSpPr>
-          <p:cNvPr id="27" name="Rectangle 26"/>
-          <p:cNvSpPr/>
-          <p:nvPr/>
-        </p:nvSpPr>
-        <p:spPr>
-          <a:xfrm>
-            <a:off x="9745498" y="2632281"/>
-            <a:ext cx="2250000" cy="288000"/>
-          </a:xfrm>
-          <a:prstGeom prst="rect">
-            <a:avLst/>
-          </a:prstGeom>
-          <a:solidFill>
-            <a:schemeClr val="accent6">
-              <a:lumMod val="40000"/>
-              <a:lumOff val="60000"/>
-            </a:schemeClr>
-          </a:solidFill>
-        </p:spPr>
-        <p:style>
-          <a:lnRef idx="2">
-            <a:schemeClr val="accent1">
-              <a:shade val="50000"/>
-            </a:schemeClr>
-          </a:lnRef>
-          <a:fillRef idx="1">
-            <a:schemeClr val="accent1"/>
-          </a:fillRef>
-          <a:effectRef idx="0">
-            <a:schemeClr val="accent1"/>
-          </a:effectRef>
-          <a:fontRef idx="minor">
-            <a:schemeClr val="lt1"/>
-          </a:fontRef>
-        </p:style>
-        <p:txBody>
-          <a:bodyPr rtlCol="0" anchor="ctr"/>
-          <a:lstStyle/>
-          <a:p>
-            <a:pPr algn="ctr"/>
-            <a:r>
-              <a:rPr lang="en-US" dirty="0" smtClean="0"/>
-              <a:t>y2</a:t>
-            </a:r>
-            <a:endParaRPr lang="en-US" dirty="0"/>
-          </a:p>
-        </p:txBody>
-      </p:sp>
-      <p:sp>
-        <p:nvSpPr>
-          <p:cNvPr id="28" name="Rectangle 27"/>
-          <p:cNvSpPr/>
-          <p:nvPr/>
-        </p:nvSpPr>
-        <p:spPr>
-          <a:xfrm>
-            <a:off x="9745498" y="3043962"/>
-            <a:ext cx="2250000" cy="288000"/>
-          </a:xfrm>
-          <a:prstGeom prst="rect">
-            <a:avLst/>
-          </a:prstGeom>
-          <a:solidFill>
-            <a:schemeClr val="accent6">
-              <a:lumMod val="40000"/>
-              <a:lumOff val="60000"/>
-            </a:schemeClr>
-          </a:solidFill>
-        </p:spPr>
-        <p:style>
-          <a:lnRef idx="2">
-            <a:schemeClr val="accent1">
-              <a:shade val="50000"/>
-            </a:schemeClr>
-          </a:lnRef>
-          <a:fillRef idx="1">
-            <a:schemeClr val="accent1"/>
-          </a:fillRef>
-          <a:effectRef idx="0">
-            <a:schemeClr val="accent1"/>
-          </a:effectRef>
-          <a:fontRef idx="minor">
-            <a:schemeClr val="lt1"/>
-          </a:fontRef>
-        </p:style>
-        <p:txBody>
-          <a:bodyPr rtlCol="0" anchor="ctr"/>
-          <a:lstStyle/>
-          <a:p>
-            <a:pPr algn="ctr"/>
-            <a:r>
-              <a:rPr lang="en-US" dirty="0" smtClean="0"/>
-              <a:t>Tilde_y2</a:t>
-            </a:r>
-            <a:endParaRPr lang="en-US" dirty="0"/>
-          </a:p>
-        </p:txBody>
-      </p:sp>
-      <p:sp>
-        <p:nvSpPr>
-          <p:cNvPr id="29" name="Rectangle 28"/>
-          <p:cNvSpPr/>
-          <p:nvPr/>
-        </p:nvSpPr>
-        <p:spPr>
-          <a:xfrm>
-            <a:off x="10164786" y="3455643"/>
-            <a:ext cx="1440000" cy="288000"/>
-          </a:xfrm>
-          <a:prstGeom prst="rect">
-            <a:avLst/>
-          </a:prstGeom>
-          <a:solidFill>
-            <a:schemeClr val="accent4">
-              <a:lumMod val="60000"/>
-              <a:lumOff val="40000"/>
-            </a:schemeClr>
-          </a:solidFill>
-        </p:spPr>
-        <p:style>
-          <a:lnRef idx="2">
-            <a:schemeClr val="accent1">
-              <a:shade val="50000"/>
-            </a:schemeClr>
-          </a:lnRef>
-          <a:fillRef idx="1">
-            <a:schemeClr val="accent1"/>
-          </a:fillRef>
-          <a:effectRef idx="0">
-            <a:schemeClr val="accent1"/>
-          </a:effectRef>
-          <a:fontRef idx="minor">
-            <a:schemeClr val="lt1"/>
-          </a:fontRef>
-        </p:style>
-        <p:txBody>
-          <a:bodyPr rtlCol="0" anchor="ctr"/>
-          <a:lstStyle/>
-          <a:p>
-            <a:pPr algn="ctr"/>
-            <a:r>
-              <a:rPr lang="en-US" dirty="0" smtClean="0"/>
-              <a:t>y3</a:t>
-            </a:r>
-            <a:endParaRPr lang="en-US" dirty="0"/>
-          </a:p>
-        </p:txBody>
-      </p:sp>
-      <p:sp>
-        <p:nvSpPr>
-          <p:cNvPr id="30" name="Rectangle 29"/>
-          <p:cNvSpPr/>
-          <p:nvPr/>
-        </p:nvSpPr>
-        <p:spPr>
-          <a:xfrm>
-            <a:off x="9759786" y="3867324"/>
-            <a:ext cx="2250000" cy="288000"/>
-          </a:xfrm>
-          <a:prstGeom prst="rect">
-            <a:avLst/>
-          </a:prstGeom>
-          <a:solidFill>
-            <a:schemeClr val="accent4">
-              <a:lumMod val="60000"/>
-              <a:lumOff val="40000"/>
-            </a:schemeClr>
-          </a:solidFill>
-        </p:spPr>
-        <p:style>
-          <a:lnRef idx="2">
-            <a:schemeClr val="accent1">
-              <a:shade val="50000"/>
-            </a:schemeClr>
-          </a:lnRef>
-          <a:fillRef idx="1">
-            <a:schemeClr val="accent1"/>
-          </a:fillRef>
-          <a:effectRef idx="0">
-            <a:schemeClr val="accent1"/>
-          </a:effectRef>
-          <a:fontRef idx="minor">
-            <a:schemeClr val="lt1"/>
-          </a:fontRef>
-        </p:style>
-        <p:txBody>
-          <a:bodyPr rtlCol="0" anchor="ctr"/>
-          <a:lstStyle/>
-          <a:p>
-            <a:pPr algn="ctr"/>
-            <a:r>
-              <a:rPr lang="en-US" dirty="0" smtClean="0"/>
-              <a:t>z3</a:t>
-            </a:r>
-            <a:endParaRPr lang="en-US" dirty="0"/>
-          </a:p>
-        </p:txBody>
-      </p:sp>
-      <p:sp>
-        <p:nvSpPr>
-          <p:cNvPr id="31" name="Rectangle 30"/>
-          <p:cNvSpPr/>
-          <p:nvPr/>
-        </p:nvSpPr>
-        <p:spPr>
-          <a:xfrm>
-            <a:off x="9264786" y="4279005"/>
-            <a:ext cx="3240000" cy="288000"/>
-          </a:xfrm>
-          <a:prstGeom prst="rect">
-            <a:avLst/>
-          </a:prstGeom>
-          <a:solidFill>
-            <a:schemeClr val="accent6">
-              <a:lumMod val="40000"/>
-              <a:lumOff val="60000"/>
-            </a:schemeClr>
-          </a:solidFill>
-        </p:spPr>
-        <p:style>
-          <a:lnRef idx="2">
-            <a:schemeClr val="accent1">
-              <a:shade val="50000"/>
-            </a:schemeClr>
-          </a:lnRef>
-          <a:fillRef idx="1">
-            <a:schemeClr val="accent1"/>
-          </a:fillRef>
-          <a:effectRef idx="0">
-            <a:schemeClr val="accent1"/>
-          </a:effectRef>
-          <a:fontRef idx="minor">
-            <a:schemeClr val="lt1"/>
-          </a:fontRef>
-        </p:style>
-        <p:txBody>
-          <a:bodyPr rtlCol="0" anchor="ctr"/>
-          <a:lstStyle/>
-          <a:p>
-            <a:pPr algn="ctr"/>
-            <a:r>
-              <a:rPr lang="en-US" dirty="0" smtClean="0"/>
-              <a:t>z2</a:t>
-            </a:r>
-            <a:endParaRPr lang="en-US" dirty="0"/>
-          </a:p>
-        </p:txBody>
-      </p:sp>
-      <p:sp>
-        <p:nvSpPr>
-          <p:cNvPr id="32" name="Rectangle 31"/>
-          <p:cNvSpPr/>
-          <p:nvPr/>
-        </p:nvSpPr>
-        <p:spPr>
-          <a:xfrm>
-            <a:off x="10420498" y="4690685"/>
-            <a:ext cx="900000" cy="288000"/>
-          </a:xfrm>
-          <a:prstGeom prst="rect">
-            <a:avLst/>
-          </a:prstGeom>
-          <a:solidFill>
-            <a:schemeClr val="accent2">
-              <a:lumMod val="60000"/>
-              <a:lumOff val="40000"/>
-            </a:schemeClr>
-          </a:solidFill>
-        </p:spPr>
-        <p:style>
-          <a:lnRef idx="2">
-            <a:schemeClr val="accent1">
-              <a:shade val="50000"/>
-            </a:schemeClr>
-          </a:lnRef>
-          <a:fillRef idx="1">
-            <a:schemeClr val="accent1"/>
-          </a:fillRef>
-          <a:effectRef idx="0">
-            <a:schemeClr val="accent1"/>
-          </a:effectRef>
-          <a:fontRef idx="minor">
-            <a:schemeClr val="lt1"/>
-          </a:fontRef>
-        </p:style>
-        <p:txBody>
-          <a:bodyPr rtlCol="0" anchor="ctr"/>
-          <a:lstStyle/>
-          <a:p>
-            <a:pPr algn="ctr"/>
-            <a:r>
-              <a:rPr lang="en-US" dirty="0" smtClean="0"/>
-              <a:t>z1</a:t>
-            </a:r>
-            <a:endParaRPr lang="en-US" dirty="0"/>
-          </a:p>
-        </p:txBody>
-      </p:sp>
-      <p:sp>
-        <p:nvSpPr>
-          <p:cNvPr id="33" name="TextBox 32"/>
-          <p:cNvSpPr txBox="1"/>
-          <p:nvPr/>
-        </p:nvSpPr>
-        <p:spPr>
-          <a:xfrm>
-            <a:off x="9482046" y="4978685"/>
-            <a:ext cx="3008452" cy="369332"/>
-          </a:xfrm>
-          <a:prstGeom prst="rect">
-            <a:avLst/>
-          </a:prstGeom>
-          <a:noFill/>
-        </p:spPr>
-        <p:txBody>
-          <a:bodyPr wrap="none" rtlCol="0">
-            <a:spAutoFit/>
-          </a:bodyPr>
-          <a:lstStyle/>
-          <a:p>
-            <a:r>
-              <a:rPr lang="en-US" dirty="0" smtClean="0"/>
-              <a:t>Deep </a:t>
-            </a:r>
-            <a:r>
-              <a:rPr lang="en-US" dirty="0" err="1" smtClean="0"/>
-              <a:t>Denoising</a:t>
-            </a:r>
-            <a:r>
-              <a:rPr lang="en-US" dirty="0" smtClean="0"/>
-              <a:t> Auto-encoder</a:t>
-            </a:r>
-            <a:endParaRPr lang="en-US" dirty="0"/>
-          </a:p>
-        </p:txBody>
-      </p:sp>
+        </p:nvGrpSpPr>
+        <p:grpSpPr>
+          <a:xfrm>
+            <a:off x="7076870" y="2975987"/>
+            <a:ext cx="2251682" cy="572789"/>
+            <a:chOff x="6809672" y="2357175"/>
+            <a:chExt cx="2251682" cy="572789"/>
+          </a:xfrm>
+        </p:grpSpPr>
+        <p:sp>
+          <p:nvSpPr>
+            <p:cNvPr id="58" name="Rectangle 57"/>
+            <p:cNvSpPr/>
+            <p:nvPr/>
+          </p:nvSpPr>
+          <p:spPr>
+            <a:xfrm>
+              <a:off x="6811354" y="2357175"/>
+              <a:ext cx="2250000" cy="288000"/>
+            </a:xfrm>
+            <a:prstGeom prst="rect">
+              <a:avLst/>
+            </a:prstGeom>
+            <a:solidFill>
+              <a:schemeClr val="accent6">
+                <a:lumMod val="40000"/>
+                <a:lumOff val="60000"/>
+              </a:schemeClr>
+            </a:solidFill>
+          </p:spPr>
+          <p:style>
+            <a:lnRef idx="2">
+              <a:schemeClr val="accent1">
+                <a:shade val="50000"/>
+              </a:schemeClr>
+            </a:lnRef>
+            <a:fillRef idx="1">
+              <a:schemeClr val="accent1"/>
+            </a:fillRef>
+            <a:effectRef idx="0">
+              <a:schemeClr val="accent1"/>
+            </a:effectRef>
+            <a:fontRef idx="minor">
+              <a:schemeClr val="lt1"/>
+            </a:fontRef>
+          </p:style>
+          <p:txBody>
+            <a:bodyPr rtlCol="0" anchor="ctr"/>
+            <a:lstStyle/>
+            <a:p>
+              <a:pPr algn="ctr"/>
+              <a:r>
+                <a:rPr lang="en-US" dirty="0" smtClean="0"/>
+                <a:t>Y2 (625)</a:t>
+              </a:r>
+              <a:endParaRPr lang="en-US" dirty="0"/>
+            </a:p>
+          </p:txBody>
+        </p:sp>
+        <p:sp>
+          <p:nvSpPr>
+            <p:cNvPr id="59" name="Rectangle 58"/>
+            <p:cNvSpPr/>
+            <p:nvPr/>
+          </p:nvSpPr>
+          <p:spPr>
+            <a:xfrm>
+              <a:off x="6809672" y="2641964"/>
+              <a:ext cx="2250000" cy="288000"/>
+            </a:xfrm>
+            <a:prstGeom prst="rect">
+              <a:avLst/>
+            </a:prstGeom>
+            <a:solidFill>
+              <a:schemeClr val="accent6">
+                <a:lumMod val="40000"/>
+                <a:lumOff val="60000"/>
+              </a:schemeClr>
+            </a:solidFill>
+          </p:spPr>
+          <p:style>
+            <a:lnRef idx="2">
+              <a:schemeClr val="accent1">
+                <a:shade val="50000"/>
+              </a:schemeClr>
+            </a:lnRef>
+            <a:fillRef idx="1">
+              <a:schemeClr val="accent1"/>
+            </a:fillRef>
+            <a:effectRef idx="0">
+              <a:schemeClr val="accent1"/>
+            </a:effectRef>
+            <a:fontRef idx="minor">
+              <a:schemeClr val="lt1"/>
+            </a:fontRef>
+          </p:style>
+          <p:txBody>
+            <a:bodyPr rtlCol="0" anchor="ctr"/>
+            <a:lstStyle/>
+            <a:p>
+              <a:pPr algn="ctr"/>
+              <a:r>
+                <a:rPr lang="en-US" dirty="0" smtClean="0"/>
+                <a:t>Tilde_y2 (625)</a:t>
+              </a:r>
+              <a:endParaRPr lang="en-US" dirty="0"/>
+            </a:p>
+          </p:txBody>
+        </p:sp>
+      </p:grpSp>
     </p:spTree>
     <p:extLst>
       <p:ext uri="{BB962C8B-B14F-4D97-AF65-F5344CB8AC3E}">
-        <p14:creationId xmlns:p14="http://schemas.microsoft.com/office/powerpoint/2010/main" val="357238648"/>
+        <p14:creationId xmlns:p14="http://schemas.microsoft.com/office/powerpoint/2010/main" val="1221469157"/>
       </p:ext>
     </p:extLst>
   </p:cSld>

</xml_diff>